<commit_message>
Updated parte 1 y 4
</commit_message>
<xml_diff>
--- a/Parte1-Liliana-Motivacion.pptx
+++ b/Parte1-Liliana-Motivacion.pptx
@@ -7,15 +7,19 @@
   <p:sldIdLst>
     <p:sldId id="256" r:id="rId2"/>
     <p:sldId id="257" r:id="rId3"/>
-    <p:sldId id="258" r:id="rId4"/>
+    <p:sldId id="260" r:id="rId4"/>
     <p:sldId id="259" r:id="rId5"/>
-    <p:sldId id="260" r:id="rId6"/>
+    <p:sldId id="258" r:id="rId6"/>
+    <p:sldId id="261" r:id="rId7"/>
+    <p:sldId id="262" r:id="rId8"/>
+    <p:sldId id="264" r:id="rId9"/>
+    <p:sldId id="263" r:id="rId10"/>
   </p:sldIdLst>
   <p:sldSz cx="12192000" cy="6858000"/>
   <p:notesSz cx="6858000" cy="9144000"/>
   <p:defaultTextStyle>
     <a:defPPr>
-      <a:defRPr lang="en-CL"/>
+      <a:defRPr lang="x-none"/>
     </a:defPPr>
     <a:lvl1pPr marL="0" algn="l" defTabSz="914400" rtl="0" eaLnBrk="1" latinLnBrk="0" hangingPunct="1">
       <a:defRPr sz="1800" kern="1200">
@@ -138,7 +142,7 @@
           <p:cNvPr id="2" name="Title 1">
             <a:extLst>
               <a:ext uri="{FF2B5EF4-FFF2-40B4-BE49-F238E27FC236}">
-                <a16:creationId xmlns:a16="http://schemas.microsoft.com/office/drawing/2014/main" id="{A7450998-2826-8644-921D-988BBF963928}"/>
+                <a16:creationId xmlns:a16="http://schemas.microsoft.com/office/drawing/2014/main" xmlns="" id="{A7450998-2826-8644-921D-988BBF963928}"/>
               </a:ext>
             </a:extLst>
           </p:cNvPr>
@@ -175,7 +179,7 @@
           <p:cNvPr id="3" name="Subtitle 2">
             <a:extLst>
               <a:ext uri="{FF2B5EF4-FFF2-40B4-BE49-F238E27FC236}">
-                <a16:creationId xmlns:a16="http://schemas.microsoft.com/office/drawing/2014/main" id="{B87B2819-13A3-8C43-B6E2-431CEE7C196E}"/>
+                <a16:creationId xmlns:a16="http://schemas.microsoft.com/office/drawing/2014/main" xmlns="" id="{B87B2819-13A3-8C43-B6E2-431CEE7C196E}"/>
               </a:ext>
             </a:extLst>
           </p:cNvPr>
@@ -245,7 +249,7 @@
           <p:cNvPr id="4" name="Date Placeholder 3">
             <a:extLst>
               <a:ext uri="{FF2B5EF4-FFF2-40B4-BE49-F238E27FC236}">
-                <a16:creationId xmlns:a16="http://schemas.microsoft.com/office/drawing/2014/main" id="{7BE7C0CA-8055-6444-A209-DD5A21DCA562}"/>
+                <a16:creationId xmlns:a16="http://schemas.microsoft.com/office/drawing/2014/main" xmlns="" id="{7BE7C0CA-8055-6444-A209-DD5A21DCA562}"/>
               </a:ext>
             </a:extLst>
           </p:cNvPr>
@@ -263,7 +267,7 @@
           <a:p>
             <a:fld id="{636594A3-C46B-8D41-BF54-29191C81F9E8}" type="datetimeFigureOut">
               <a:rPr lang="en-US" smtClean="0"/>
-              <a:t>10/26/21</a:t>
+              <a:t>10/28/2021</a:t>
             </a:fld>
             <a:endParaRPr lang="en-US"/>
           </a:p>
@@ -274,7 +278,7 @@
           <p:cNvPr id="5" name="Footer Placeholder 4">
             <a:extLst>
               <a:ext uri="{FF2B5EF4-FFF2-40B4-BE49-F238E27FC236}">
-                <a16:creationId xmlns:a16="http://schemas.microsoft.com/office/drawing/2014/main" id="{5A327A23-4A14-D042-A6C9-F46C4A7F3D75}"/>
+                <a16:creationId xmlns:a16="http://schemas.microsoft.com/office/drawing/2014/main" xmlns="" id="{5A327A23-4A14-D042-A6C9-F46C4A7F3D75}"/>
               </a:ext>
             </a:extLst>
           </p:cNvPr>
@@ -299,7 +303,7 @@
           <p:cNvPr id="6" name="Slide Number Placeholder 5">
             <a:extLst>
               <a:ext uri="{FF2B5EF4-FFF2-40B4-BE49-F238E27FC236}">
-                <a16:creationId xmlns:a16="http://schemas.microsoft.com/office/drawing/2014/main" id="{4C64F572-AD97-834D-8AF0-5DE63B542F1D}"/>
+                <a16:creationId xmlns:a16="http://schemas.microsoft.com/office/drawing/2014/main" xmlns="" id="{4C64F572-AD97-834D-8AF0-5DE63B542F1D}"/>
               </a:ext>
             </a:extLst>
           </p:cNvPr>
@@ -317,7 +321,7 @@
           <a:p>
             <a:fld id="{6EEFBB86-C685-9B4A-9FB7-5ABC4E046DC9}" type="slidenum">
               <a:rPr lang="en-US" smtClean="0"/>
-              <a:t>‹#›</a:t>
+              <a:t>‹Nº›</a:t>
             </a:fld>
             <a:endParaRPr lang="en-US"/>
           </a:p>
@@ -358,7 +362,7 @@
           <p:cNvPr id="2" name="Title 1">
             <a:extLst>
               <a:ext uri="{FF2B5EF4-FFF2-40B4-BE49-F238E27FC236}">
-                <a16:creationId xmlns:a16="http://schemas.microsoft.com/office/drawing/2014/main" id="{4A990DAA-06B4-C447-8042-5E9A8322AF63}"/>
+                <a16:creationId xmlns:a16="http://schemas.microsoft.com/office/drawing/2014/main" xmlns="" id="{4A990DAA-06B4-C447-8042-5E9A8322AF63}"/>
               </a:ext>
             </a:extLst>
           </p:cNvPr>
@@ -386,7 +390,7 @@
           <p:cNvPr id="3" name="Vertical Text Placeholder 2">
             <a:extLst>
               <a:ext uri="{FF2B5EF4-FFF2-40B4-BE49-F238E27FC236}">
-                <a16:creationId xmlns:a16="http://schemas.microsoft.com/office/drawing/2014/main" id="{20287DB3-A06E-B447-BA97-D5AE8D4AD857}"/>
+                <a16:creationId xmlns:a16="http://schemas.microsoft.com/office/drawing/2014/main" xmlns="" id="{20287DB3-A06E-B447-BA97-D5AE8D4AD857}"/>
               </a:ext>
             </a:extLst>
           </p:cNvPr>
@@ -443,7 +447,7 @@
           <p:cNvPr id="4" name="Date Placeholder 3">
             <a:extLst>
               <a:ext uri="{FF2B5EF4-FFF2-40B4-BE49-F238E27FC236}">
-                <a16:creationId xmlns:a16="http://schemas.microsoft.com/office/drawing/2014/main" id="{9D920332-AC5D-D845-93F1-5E4F1A2990B2}"/>
+                <a16:creationId xmlns:a16="http://schemas.microsoft.com/office/drawing/2014/main" xmlns="" id="{9D920332-AC5D-D845-93F1-5E4F1A2990B2}"/>
               </a:ext>
             </a:extLst>
           </p:cNvPr>
@@ -461,7 +465,7 @@
           <a:p>
             <a:fld id="{636594A3-C46B-8D41-BF54-29191C81F9E8}" type="datetimeFigureOut">
               <a:rPr lang="en-US" smtClean="0"/>
-              <a:t>10/26/21</a:t>
+              <a:t>10/28/2021</a:t>
             </a:fld>
             <a:endParaRPr lang="en-US"/>
           </a:p>
@@ -472,7 +476,7 @@
           <p:cNvPr id="5" name="Footer Placeholder 4">
             <a:extLst>
               <a:ext uri="{FF2B5EF4-FFF2-40B4-BE49-F238E27FC236}">
-                <a16:creationId xmlns:a16="http://schemas.microsoft.com/office/drawing/2014/main" id="{C0FF9A09-51C8-684B-A11C-B83C4D182816}"/>
+                <a16:creationId xmlns:a16="http://schemas.microsoft.com/office/drawing/2014/main" xmlns="" id="{C0FF9A09-51C8-684B-A11C-B83C4D182816}"/>
               </a:ext>
             </a:extLst>
           </p:cNvPr>
@@ -497,7 +501,7 @@
           <p:cNvPr id="6" name="Slide Number Placeholder 5">
             <a:extLst>
               <a:ext uri="{FF2B5EF4-FFF2-40B4-BE49-F238E27FC236}">
-                <a16:creationId xmlns:a16="http://schemas.microsoft.com/office/drawing/2014/main" id="{7F0B35C6-F73D-9E49-915E-079F79150BB4}"/>
+                <a16:creationId xmlns:a16="http://schemas.microsoft.com/office/drawing/2014/main" xmlns="" id="{7F0B35C6-F73D-9E49-915E-079F79150BB4}"/>
               </a:ext>
             </a:extLst>
           </p:cNvPr>
@@ -515,7 +519,7 @@
           <a:p>
             <a:fld id="{6EEFBB86-C685-9B4A-9FB7-5ABC4E046DC9}" type="slidenum">
               <a:rPr lang="en-US" smtClean="0"/>
-              <a:t>‹#›</a:t>
+              <a:t>‹Nº›</a:t>
             </a:fld>
             <a:endParaRPr lang="en-US"/>
           </a:p>
@@ -556,7 +560,7 @@
           <p:cNvPr id="2" name="Vertical Title 1">
             <a:extLst>
               <a:ext uri="{FF2B5EF4-FFF2-40B4-BE49-F238E27FC236}">
-                <a16:creationId xmlns:a16="http://schemas.microsoft.com/office/drawing/2014/main" id="{77F98E81-2E13-294D-A19D-8BCF1681E51C}"/>
+                <a16:creationId xmlns:a16="http://schemas.microsoft.com/office/drawing/2014/main" xmlns="" id="{77F98E81-2E13-294D-A19D-8BCF1681E51C}"/>
               </a:ext>
             </a:extLst>
           </p:cNvPr>
@@ -589,7 +593,7 @@
           <p:cNvPr id="3" name="Vertical Text Placeholder 2">
             <a:extLst>
               <a:ext uri="{FF2B5EF4-FFF2-40B4-BE49-F238E27FC236}">
-                <a16:creationId xmlns:a16="http://schemas.microsoft.com/office/drawing/2014/main" id="{83F57949-62F9-A543-84A8-F6D4C106D72C}"/>
+                <a16:creationId xmlns:a16="http://schemas.microsoft.com/office/drawing/2014/main" xmlns="" id="{83F57949-62F9-A543-84A8-F6D4C106D72C}"/>
               </a:ext>
             </a:extLst>
           </p:cNvPr>
@@ -651,7 +655,7 @@
           <p:cNvPr id="4" name="Date Placeholder 3">
             <a:extLst>
               <a:ext uri="{FF2B5EF4-FFF2-40B4-BE49-F238E27FC236}">
-                <a16:creationId xmlns:a16="http://schemas.microsoft.com/office/drawing/2014/main" id="{C118B8CE-A773-2F49-BB88-E72A006FD029}"/>
+                <a16:creationId xmlns:a16="http://schemas.microsoft.com/office/drawing/2014/main" xmlns="" id="{C118B8CE-A773-2F49-BB88-E72A006FD029}"/>
               </a:ext>
             </a:extLst>
           </p:cNvPr>
@@ -669,7 +673,7 @@
           <a:p>
             <a:fld id="{636594A3-C46B-8D41-BF54-29191C81F9E8}" type="datetimeFigureOut">
               <a:rPr lang="en-US" smtClean="0"/>
-              <a:t>10/26/21</a:t>
+              <a:t>10/28/2021</a:t>
             </a:fld>
             <a:endParaRPr lang="en-US"/>
           </a:p>
@@ -680,7 +684,7 @@
           <p:cNvPr id="5" name="Footer Placeholder 4">
             <a:extLst>
               <a:ext uri="{FF2B5EF4-FFF2-40B4-BE49-F238E27FC236}">
-                <a16:creationId xmlns:a16="http://schemas.microsoft.com/office/drawing/2014/main" id="{3AA33615-3678-874D-BE46-90AEE22AFD1B}"/>
+                <a16:creationId xmlns:a16="http://schemas.microsoft.com/office/drawing/2014/main" xmlns="" id="{3AA33615-3678-874D-BE46-90AEE22AFD1B}"/>
               </a:ext>
             </a:extLst>
           </p:cNvPr>
@@ -705,7 +709,7 @@
           <p:cNvPr id="6" name="Slide Number Placeholder 5">
             <a:extLst>
               <a:ext uri="{FF2B5EF4-FFF2-40B4-BE49-F238E27FC236}">
-                <a16:creationId xmlns:a16="http://schemas.microsoft.com/office/drawing/2014/main" id="{16651037-16EE-2043-8133-20551D9F166B}"/>
+                <a16:creationId xmlns:a16="http://schemas.microsoft.com/office/drawing/2014/main" xmlns="" id="{16651037-16EE-2043-8133-20551D9F166B}"/>
               </a:ext>
             </a:extLst>
           </p:cNvPr>
@@ -723,7 +727,7 @@
           <a:p>
             <a:fld id="{6EEFBB86-C685-9B4A-9FB7-5ABC4E046DC9}" type="slidenum">
               <a:rPr lang="en-US" smtClean="0"/>
-              <a:t>‹#›</a:t>
+              <a:t>‹Nº›</a:t>
             </a:fld>
             <a:endParaRPr lang="en-US"/>
           </a:p>
@@ -764,7 +768,7 @@
           <p:cNvPr id="2" name="Title 1">
             <a:extLst>
               <a:ext uri="{FF2B5EF4-FFF2-40B4-BE49-F238E27FC236}">
-                <a16:creationId xmlns:a16="http://schemas.microsoft.com/office/drawing/2014/main" id="{EDD57191-304B-DC45-BDE7-26CA93B19FB1}"/>
+                <a16:creationId xmlns:a16="http://schemas.microsoft.com/office/drawing/2014/main" xmlns="" id="{EDD57191-304B-DC45-BDE7-26CA93B19FB1}"/>
               </a:ext>
             </a:extLst>
           </p:cNvPr>
@@ -792,7 +796,7 @@
           <p:cNvPr id="3" name="Content Placeholder 2">
             <a:extLst>
               <a:ext uri="{FF2B5EF4-FFF2-40B4-BE49-F238E27FC236}">
-                <a16:creationId xmlns:a16="http://schemas.microsoft.com/office/drawing/2014/main" id="{3217100D-F065-2943-9BCB-483350A86DD8}"/>
+                <a16:creationId xmlns:a16="http://schemas.microsoft.com/office/drawing/2014/main" xmlns="" id="{3217100D-F065-2943-9BCB-483350A86DD8}"/>
               </a:ext>
             </a:extLst>
           </p:cNvPr>
@@ -849,7 +853,7 @@
           <p:cNvPr id="4" name="Date Placeholder 3">
             <a:extLst>
               <a:ext uri="{FF2B5EF4-FFF2-40B4-BE49-F238E27FC236}">
-                <a16:creationId xmlns:a16="http://schemas.microsoft.com/office/drawing/2014/main" id="{EAF7C61D-7BEE-D946-A13F-5ED5647B8421}"/>
+                <a16:creationId xmlns:a16="http://schemas.microsoft.com/office/drawing/2014/main" xmlns="" id="{EAF7C61D-7BEE-D946-A13F-5ED5647B8421}"/>
               </a:ext>
             </a:extLst>
           </p:cNvPr>
@@ -867,7 +871,7 @@
           <a:p>
             <a:fld id="{636594A3-C46B-8D41-BF54-29191C81F9E8}" type="datetimeFigureOut">
               <a:rPr lang="en-US" smtClean="0"/>
-              <a:t>10/26/21</a:t>
+              <a:t>10/28/2021</a:t>
             </a:fld>
             <a:endParaRPr lang="en-US"/>
           </a:p>
@@ -878,7 +882,7 @@
           <p:cNvPr id="5" name="Footer Placeholder 4">
             <a:extLst>
               <a:ext uri="{FF2B5EF4-FFF2-40B4-BE49-F238E27FC236}">
-                <a16:creationId xmlns:a16="http://schemas.microsoft.com/office/drawing/2014/main" id="{B8CF440B-27A5-DE4A-8264-BE32B8B394A1}"/>
+                <a16:creationId xmlns:a16="http://schemas.microsoft.com/office/drawing/2014/main" xmlns="" id="{B8CF440B-27A5-DE4A-8264-BE32B8B394A1}"/>
               </a:ext>
             </a:extLst>
           </p:cNvPr>
@@ -903,7 +907,7 @@
           <p:cNvPr id="6" name="Slide Number Placeholder 5">
             <a:extLst>
               <a:ext uri="{FF2B5EF4-FFF2-40B4-BE49-F238E27FC236}">
-                <a16:creationId xmlns:a16="http://schemas.microsoft.com/office/drawing/2014/main" id="{3F948D7B-9C87-1746-8C80-05BB9A6082F2}"/>
+                <a16:creationId xmlns:a16="http://schemas.microsoft.com/office/drawing/2014/main" xmlns="" id="{3F948D7B-9C87-1746-8C80-05BB9A6082F2}"/>
               </a:ext>
             </a:extLst>
           </p:cNvPr>
@@ -921,7 +925,7 @@
           <a:p>
             <a:fld id="{6EEFBB86-C685-9B4A-9FB7-5ABC4E046DC9}" type="slidenum">
               <a:rPr lang="en-US" smtClean="0"/>
-              <a:t>‹#›</a:t>
+              <a:t>‹Nº›</a:t>
             </a:fld>
             <a:endParaRPr lang="en-US"/>
           </a:p>
@@ -962,7 +966,7 @@
           <p:cNvPr id="2" name="Title 1">
             <a:extLst>
               <a:ext uri="{FF2B5EF4-FFF2-40B4-BE49-F238E27FC236}">
-                <a16:creationId xmlns:a16="http://schemas.microsoft.com/office/drawing/2014/main" id="{855B81AA-A127-694B-A65D-6BA9932587CD}"/>
+                <a16:creationId xmlns:a16="http://schemas.microsoft.com/office/drawing/2014/main" xmlns="" id="{855B81AA-A127-694B-A65D-6BA9932587CD}"/>
               </a:ext>
             </a:extLst>
           </p:cNvPr>
@@ -999,7 +1003,7 @@
           <p:cNvPr id="3" name="Text Placeholder 2">
             <a:extLst>
               <a:ext uri="{FF2B5EF4-FFF2-40B4-BE49-F238E27FC236}">
-                <a16:creationId xmlns:a16="http://schemas.microsoft.com/office/drawing/2014/main" id="{160C854A-9B1D-F145-9334-5CC27F9077F7}"/>
+                <a16:creationId xmlns:a16="http://schemas.microsoft.com/office/drawing/2014/main" xmlns="" id="{160C854A-9B1D-F145-9334-5CC27F9077F7}"/>
               </a:ext>
             </a:extLst>
           </p:cNvPr>
@@ -1124,7 +1128,7 @@
           <p:cNvPr id="4" name="Date Placeholder 3">
             <a:extLst>
               <a:ext uri="{FF2B5EF4-FFF2-40B4-BE49-F238E27FC236}">
-                <a16:creationId xmlns:a16="http://schemas.microsoft.com/office/drawing/2014/main" id="{E2512EDA-47C0-BE4D-85A3-C89247EE26E5}"/>
+                <a16:creationId xmlns:a16="http://schemas.microsoft.com/office/drawing/2014/main" xmlns="" id="{E2512EDA-47C0-BE4D-85A3-C89247EE26E5}"/>
               </a:ext>
             </a:extLst>
           </p:cNvPr>
@@ -1142,7 +1146,7 @@
           <a:p>
             <a:fld id="{636594A3-C46B-8D41-BF54-29191C81F9E8}" type="datetimeFigureOut">
               <a:rPr lang="en-US" smtClean="0"/>
-              <a:t>10/26/21</a:t>
+              <a:t>10/28/2021</a:t>
             </a:fld>
             <a:endParaRPr lang="en-US"/>
           </a:p>
@@ -1153,7 +1157,7 @@
           <p:cNvPr id="5" name="Footer Placeholder 4">
             <a:extLst>
               <a:ext uri="{FF2B5EF4-FFF2-40B4-BE49-F238E27FC236}">
-                <a16:creationId xmlns:a16="http://schemas.microsoft.com/office/drawing/2014/main" id="{25C2AB98-1D60-3B49-9CCC-32D34F1D3055}"/>
+                <a16:creationId xmlns:a16="http://schemas.microsoft.com/office/drawing/2014/main" xmlns="" id="{25C2AB98-1D60-3B49-9CCC-32D34F1D3055}"/>
               </a:ext>
             </a:extLst>
           </p:cNvPr>
@@ -1178,7 +1182,7 @@
           <p:cNvPr id="6" name="Slide Number Placeholder 5">
             <a:extLst>
               <a:ext uri="{FF2B5EF4-FFF2-40B4-BE49-F238E27FC236}">
-                <a16:creationId xmlns:a16="http://schemas.microsoft.com/office/drawing/2014/main" id="{E43EC239-111F-C644-8BE1-7D1D59560DB6}"/>
+                <a16:creationId xmlns:a16="http://schemas.microsoft.com/office/drawing/2014/main" xmlns="" id="{E43EC239-111F-C644-8BE1-7D1D59560DB6}"/>
               </a:ext>
             </a:extLst>
           </p:cNvPr>
@@ -1196,7 +1200,7 @@
           <a:p>
             <a:fld id="{6EEFBB86-C685-9B4A-9FB7-5ABC4E046DC9}" type="slidenum">
               <a:rPr lang="en-US" smtClean="0"/>
-              <a:t>‹#›</a:t>
+              <a:t>‹Nº›</a:t>
             </a:fld>
             <a:endParaRPr lang="en-US"/>
           </a:p>
@@ -1237,7 +1241,7 @@
           <p:cNvPr id="2" name="Title 1">
             <a:extLst>
               <a:ext uri="{FF2B5EF4-FFF2-40B4-BE49-F238E27FC236}">
-                <a16:creationId xmlns:a16="http://schemas.microsoft.com/office/drawing/2014/main" id="{FB591C13-DE8D-C742-82B3-04599345D4F2}"/>
+                <a16:creationId xmlns:a16="http://schemas.microsoft.com/office/drawing/2014/main" xmlns="" id="{FB591C13-DE8D-C742-82B3-04599345D4F2}"/>
               </a:ext>
             </a:extLst>
           </p:cNvPr>
@@ -1265,7 +1269,7 @@
           <p:cNvPr id="3" name="Content Placeholder 2">
             <a:extLst>
               <a:ext uri="{FF2B5EF4-FFF2-40B4-BE49-F238E27FC236}">
-                <a16:creationId xmlns:a16="http://schemas.microsoft.com/office/drawing/2014/main" id="{FC5725A4-CE63-BC4B-8577-C323CC71AB11}"/>
+                <a16:creationId xmlns:a16="http://schemas.microsoft.com/office/drawing/2014/main" xmlns="" id="{FC5725A4-CE63-BC4B-8577-C323CC71AB11}"/>
               </a:ext>
             </a:extLst>
           </p:cNvPr>
@@ -1327,7 +1331,7 @@
           <p:cNvPr id="4" name="Content Placeholder 3">
             <a:extLst>
               <a:ext uri="{FF2B5EF4-FFF2-40B4-BE49-F238E27FC236}">
-                <a16:creationId xmlns:a16="http://schemas.microsoft.com/office/drawing/2014/main" id="{6C2A97E2-9898-6B4C-BAC3-22C811628D20}"/>
+                <a16:creationId xmlns:a16="http://schemas.microsoft.com/office/drawing/2014/main" xmlns="" id="{6C2A97E2-9898-6B4C-BAC3-22C811628D20}"/>
               </a:ext>
             </a:extLst>
           </p:cNvPr>
@@ -1389,7 +1393,7 @@
           <p:cNvPr id="5" name="Date Placeholder 4">
             <a:extLst>
               <a:ext uri="{FF2B5EF4-FFF2-40B4-BE49-F238E27FC236}">
-                <a16:creationId xmlns:a16="http://schemas.microsoft.com/office/drawing/2014/main" id="{C99AA399-AFE4-D345-BAD6-9A77288DC997}"/>
+                <a16:creationId xmlns:a16="http://schemas.microsoft.com/office/drawing/2014/main" xmlns="" id="{C99AA399-AFE4-D345-BAD6-9A77288DC997}"/>
               </a:ext>
             </a:extLst>
           </p:cNvPr>
@@ -1407,7 +1411,7 @@
           <a:p>
             <a:fld id="{636594A3-C46B-8D41-BF54-29191C81F9E8}" type="datetimeFigureOut">
               <a:rPr lang="en-US" smtClean="0"/>
-              <a:t>10/26/21</a:t>
+              <a:t>10/28/2021</a:t>
             </a:fld>
             <a:endParaRPr lang="en-US"/>
           </a:p>
@@ -1418,7 +1422,7 @@
           <p:cNvPr id="6" name="Footer Placeholder 5">
             <a:extLst>
               <a:ext uri="{FF2B5EF4-FFF2-40B4-BE49-F238E27FC236}">
-                <a16:creationId xmlns:a16="http://schemas.microsoft.com/office/drawing/2014/main" id="{3485017C-B74C-D743-B32E-1D306E453FFE}"/>
+                <a16:creationId xmlns:a16="http://schemas.microsoft.com/office/drawing/2014/main" xmlns="" id="{3485017C-B74C-D743-B32E-1D306E453FFE}"/>
               </a:ext>
             </a:extLst>
           </p:cNvPr>
@@ -1443,7 +1447,7 @@
           <p:cNvPr id="7" name="Slide Number Placeholder 6">
             <a:extLst>
               <a:ext uri="{FF2B5EF4-FFF2-40B4-BE49-F238E27FC236}">
-                <a16:creationId xmlns:a16="http://schemas.microsoft.com/office/drawing/2014/main" id="{BF432577-E227-244D-B1C0-AEEE3CCD72FA}"/>
+                <a16:creationId xmlns:a16="http://schemas.microsoft.com/office/drawing/2014/main" xmlns="" id="{BF432577-E227-244D-B1C0-AEEE3CCD72FA}"/>
               </a:ext>
             </a:extLst>
           </p:cNvPr>
@@ -1461,7 +1465,7 @@
           <a:p>
             <a:fld id="{6EEFBB86-C685-9B4A-9FB7-5ABC4E046DC9}" type="slidenum">
               <a:rPr lang="en-US" smtClean="0"/>
-              <a:t>‹#›</a:t>
+              <a:t>‹Nº›</a:t>
             </a:fld>
             <a:endParaRPr lang="en-US"/>
           </a:p>
@@ -1502,7 +1506,7 @@
           <p:cNvPr id="2" name="Title 1">
             <a:extLst>
               <a:ext uri="{FF2B5EF4-FFF2-40B4-BE49-F238E27FC236}">
-                <a16:creationId xmlns:a16="http://schemas.microsoft.com/office/drawing/2014/main" id="{FE0BE0E0-2BE7-C346-84F7-5DF7DAD43B0A}"/>
+                <a16:creationId xmlns:a16="http://schemas.microsoft.com/office/drawing/2014/main" xmlns="" id="{FE0BE0E0-2BE7-C346-84F7-5DF7DAD43B0A}"/>
               </a:ext>
             </a:extLst>
           </p:cNvPr>
@@ -1535,7 +1539,7 @@
           <p:cNvPr id="3" name="Text Placeholder 2">
             <a:extLst>
               <a:ext uri="{FF2B5EF4-FFF2-40B4-BE49-F238E27FC236}">
-                <a16:creationId xmlns:a16="http://schemas.microsoft.com/office/drawing/2014/main" id="{000F8EB2-EC54-BD47-B435-466206B12399}"/>
+                <a16:creationId xmlns:a16="http://schemas.microsoft.com/office/drawing/2014/main" xmlns="" id="{000F8EB2-EC54-BD47-B435-466206B12399}"/>
               </a:ext>
             </a:extLst>
           </p:cNvPr>
@@ -1606,7 +1610,7 @@
           <p:cNvPr id="4" name="Content Placeholder 3">
             <a:extLst>
               <a:ext uri="{FF2B5EF4-FFF2-40B4-BE49-F238E27FC236}">
-                <a16:creationId xmlns:a16="http://schemas.microsoft.com/office/drawing/2014/main" id="{365E44F2-8426-5844-8B55-FD42265B1473}"/>
+                <a16:creationId xmlns:a16="http://schemas.microsoft.com/office/drawing/2014/main" xmlns="" id="{365E44F2-8426-5844-8B55-FD42265B1473}"/>
               </a:ext>
             </a:extLst>
           </p:cNvPr>
@@ -1668,7 +1672,7 @@
           <p:cNvPr id="5" name="Text Placeholder 4">
             <a:extLst>
               <a:ext uri="{FF2B5EF4-FFF2-40B4-BE49-F238E27FC236}">
-                <a16:creationId xmlns:a16="http://schemas.microsoft.com/office/drawing/2014/main" id="{B236CF7D-485D-3148-9A53-0A60210E006B}"/>
+                <a16:creationId xmlns:a16="http://schemas.microsoft.com/office/drawing/2014/main" xmlns="" id="{B236CF7D-485D-3148-9A53-0A60210E006B}"/>
               </a:ext>
             </a:extLst>
           </p:cNvPr>
@@ -1739,7 +1743,7 @@
           <p:cNvPr id="6" name="Content Placeholder 5">
             <a:extLst>
               <a:ext uri="{FF2B5EF4-FFF2-40B4-BE49-F238E27FC236}">
-                <a16:creationId xmlns:a16="http://schemas.microsoft.com/office/drawing/2014/main" id="{C8C73EF4-155A-1946-9E8F-AED0A601E8D7}"/>
+                <a16:creationId xmlns:a16="http://schemas.microsoft.com/office/drawing/2014/main" xmlns="" id="{C8C73EF4-155A-1946-9E8F-AED0A601E8D7}"/>
               </a:ext>
             </a:extLst>
           </p:cNvPr>
@@ -1801,7 +1805,7 @@
           <p:cNvPr id="7" name="Date Placeholder 6">
             <a:extLst>
               <a:ext uri="{FF2B5EF4-FFF2-40B4-BE49-F238E27FC236}">
-                <a16:creationId xmlns:a16="http://schemas.microsoft.com/office/drawing/2014/main" id="{68010D9A-68F4-9946-ACD9-5BB45F606FCD}"/>
+                <a16:creationId xmlns:a16="http://schemas.microsoft.com/office/drawing/2014/main" xmlns="" id="{68010D9A-68F4-9946-ACD9-5BB45F606FCD}"/>
               </a:ext>
             </a:extLst>
           </p:cNvPr>
@@ -1819,7 +1823,7 @@
           <a:p>
             <a:fld id="{636594A3-C46B-8D41-BF54-29191C81F9E8}" type="datetimeFigureOut">
               <a:rPr lang="en-US" smtClean="0"/>
-              <a:t>10/26/21</a:t>
+              <a:t>10/28/2021</a:t>
             </a:fld>
             <a:endParaRPr lang="en-US"/>
           </a:p>
@@ -1830,7 +1834,7 @@
           <p:cNvPr id="8" name="Footer Placeholder 7">
             <a:extLst>
               <a:ext uri="{FF2B5EF4-FFF2-40B4-BE49-F238E27FC236}">
-                <a16:creationId xmlns:a16="http://schemas.microsoft.com/office/drawing/2014/main" id="{E8D83EAB-C61B-F546-85A6-6B5144E8E4B5}"/>
+                <a16:creationId xmlns:a16="http://schemas.microsoft.com/office/drawing/2014/main" xmlns="" id="{E8D83EAB-C61B-F546-85A6-6B5144E8E4B5}"/>
               </a:ext>
             </a:extLst>
           </p:cNvPr>
@@ -1855,7 +1859,7 @@
           <p:cNvPr id="9" name="Slide Number Placeholder 8">
             <a:extLst>
               <a:ext uri="{FF2B5EF4-FFF2-40B4-BE49-F238E27FC236}">
-                <a16:creationId xmlns:a16="http://schemas.microsoft.com/office/drawing/2014/main" id="{E81B950B-DA73-C045-8AEE-7C6D19D753E0}"/>
+                <a16:creationId xmlns:a16="http://schemas.microsoft.com/office/drawing/2014/main" xmlns="" id="{E81B950B-DA73-C045-8AEE-7C6D19D753E0}"/>
               </a:ext>
             </a:extLst>
           </p:cNvPr>
@@ -1873,7 +1877,7 @@
           <a:p>
             <a:fld id="{6EEFBB86-C685-9B4A-9FB7-5ABC4E046DC9}" type="slidenum">
               <a:rPr lang="en-US" smtClean="0"/>
-              <a:t>‹#›</a:t>
+              <a:t>‹Nº›</a:t>
             </a:fld>
             <a:endParaRPr lang="en-US"/>
           </a:p>
@@ -1914,7 +1918,7 @@
           <p:cNvPr id="2" name="Title 1">
             <a:extLst>
               <a:ext uri="{FF2B5EF4-FFF2-40B4-BE49-F238E27FC236}">
-                <a16:creationId xmlns:a16="http://schemas.microsoft.com/office/drawing/2014/main" id="{3752FC89-8817-7943-9ECE-ACAC71E6E34C}"/>
+                <a16:creationId xmlns:a16="http://schemas.microsoft.com/office/drawing/2014/main" xmlns="" id="{3752FC89-8817-7943-9ECE-ACAC71E6E34C}"/>
               </a:ext>
             </a:extLst>
           </p:cNvPr>
@@ -1942,7 +1946,7 @@
           <p:cNvPr id="3" name="Date Placeholder 2">
             <a:extLst>
               <a:ext uri="{FF2B5EF4-FFF2-40B4-BE49-F238E27FC236}">
-                <a16:creationId xmlns:a16="http://schemas.microsoft.com/office/drawing/2014/main" id="{9BCC082F-4C96-B343-ACCB-58D518BE69A7}"/>
+                <a16:creationId xmlns:a16="http://schemas.microsoft.com/office/drawing/2014/main" xmlns="" id="{9BCC082F-4C96-B343-ACCB-58D518BE69A7}"/>
               </a:ext>
             </a:extLst>
           </p:cNvPr>
@@ -1960,7 +1964,7 @@
           <a:p>
             <a:fld id="{636594A3-C46B-8D41-BF54-29191C81F9E8}" type="datetimeFigureOut">
               <a:rPr lang="en-US" smtClean="0"/>
-              <a:t>10/26/21</a:t>
+              <a:t>10/28/2021</a:t>
             </a:fld>
             <a:endParaRPr lang="en-US"/>
           </a:p>
@@ -1971,7 +1975,7 @@
           <p:cNvPr id="4" name="Footer Placeholder 3">
             <a:extLst>
               <a:ext uri="{FF2B5EF4-FFF2-40B4-BE49-F238E27FC236}">
-                <a16:creationId xmlns:a16="http://schemas.microsoft.com/office/drawing/2014/main" id="{4F3282B1-0C4A-4F40-BBCC-0FF628E781C1}"/>
+                <a16:creationId xmlns:a16="http://schemas.microsoft.com/office/drawing/2014/main" xmlns="" id="{4F3282B1-0C4A-4F40-BBCC-0FF628E781C1}"/>
               </a:ext>
             </a:extLst>
           </p:cNvPr>
@@ -1996,7 +2000,7 @@
           <p:cNvPr id="5" name="Slide Number Placeholder 4">
             <a:extLst>
               <a:ext uri="{FF2B5EF4-FFF2-40B4-BE49-F238E27FC236}">
-                <a16:creationId xmlns:a16="http://schemas.microsoft.com/office/drawing/2014/main" id="{0B463786-9194-0640-980D-01D2760AB3CA}"/>
+                <a16:creationId xmlns:a16="http://schemas.microsoft.com/office/drawing/2014/main" xmlns="" id="{0B463786-9194-0640-980D-01D2760AB3CA}"/>
               </a:ext>
             </a:extLst>
           </p:cNvPr>
@@ -2014,7 +2018,7 @@
           <a:p>
             <a:fld id="{6EEFBB86-C685-9B4A-9FB7-5ABC4E046DC9}" type="slidenum">
               <a:rPr lang="en-US" smtClean="0"/>
-              <a:t>‹#›</a:t>
+              <a:t>‹Nº›</a:t>
             </a:fld>
             <a:endParaRPr lang="en-US"/>
           </a:p>
@@ -2055,7 +2059,7 @@
           <p:cNvPr id="2" name="Date Placeholder 1">
             <a:extLst>
               <a:ext uri="{FF2B5EF4-FFF2-40B4-BE49-F238E27FC236}">
-                <a16:creationId xmlns:a16="http://schemas.microsoft.com/office/drawing/2014/main" id="{973B39E2-B75F-1A48-9BFC-4791A5A692A0}"/>
+                <a16:creationId xmlns:a16="http://schemas.microsoft.com/office/drawing/2014/main" xmlns="" id="{973B39E2-B75F-1A48-9BFC-4791A5A692A0}"/>
               </a:ext>
             </a:extLst>
           </p:cNvPr>
@@ -2073,7 +2077,7 @@
           <a:p>
             <a:fld id="{636594A3-C46B-8D41-BF54-29191C81F9E8}" type="datetimeFigureOut">
               <a:rPr lang="en-US" smtClean="0"/>
-              <a:t>10/26/21</a:t>
+              <a:t>10/28/2021</a:t>
             </a:fld>
             <a:endParaRPr lang="en-US"/>
           </a:p>
@@ -2084,7 +2088,7 @@
           <p:cNvPr id="3" name="Footer Placeholder 2">
             <a:extLst>
               <a:ext uri="{FF2B5EF4-FFF2-40B4-BE49-F238E27FC236}">
-                <a16:creationId xmlns:a16="http://schemas.microsoft.com/office/drawing/2014/main" id="{F7D5FE29-B933-0B44-9862-D1FC7EFEE0CB}"/>
+                <a16:creationId xmlns:a16="http://schemas.microsoft.com/office/drawing/2014/main" xmlns="" id="{F7D5FE29-B933-0B44-9862-D1FC7EFEE0CB}"/>
               </a:ext>
             </a:extLst>
           </p:cNvPr>
@@ -2109,7 +2113,7 @@
           <p:cNvPr id="4" name="Slide Number Placeholder 3">
             <a:extLst>
               <a:ext uri="{FF2B5EF4-FFF2-40B4-BE49-F238E27FC236}">
-                <a16:creationId xmlns:a16="http://schemas.microsoft.com/office/drawing/2014/main" id="{FC8DDAEE-201B-3F4E-8526-09242A12B684}"/>
+                <a16:creationId xmlns:a16="http://schemas.microsoft.com/office/drawing/2014/main" xmlns="" id="{FC8DDAEE-201B-3F4E-8526-09242A12B684}"/>
               </a:ext>
             </a:extLst>
           </p:cNvPr>
@@ -2127,7 +2131,7 @@
           <a:p>
             <a:fld id="{6EEFBB86-C685-9B4A-9FB7-5ABC4E046DC9}" type="slidenum">
               <a:rPr lang="en-US" smtClean="0"/>
-              <a:t>‹#›</a:t>
+              <a:t>‹Nº›</a:t>
             </a:fld>
             <a:endParaRPr lang="en-US"/>
           </a:p>
@@ -2168,7 +2172,7 @@
           <p:cNvPr id="2" name="Title 1">
             <a:extLst>
               <a:ext uri="{FF2B5EF4-FFF2-40B4-BE49-F238E27FC236}">
-                <a16:creationId xmlns:a16="http://schemas.microsoft.com/office/drawing/2014/main" id="{9FF8FF27-979E-2043-BAE0-31F484603F74}"/>
+                <a16:creationId xmlns:a16="http://schemas.microsoft.com/office/drawing/2014/main" xmlns="" id="{9FF8FF27-979E-2043-BAE0-31F484603F74}"/>
               </a:ext>
             </a:extLst>
           </p:cNvPr>
@@ -2205,7 +2209,7 @@
           <p:cNvPr id="3" name="Content Placeholder 2">
             <a:extLst>
               <a:ext uri="{FF2B5EF4-FFF2-40B4-BE49-F238E27FC236}">
-                <a16:creationId xmlns:a16="http://schemas.microsoft.com/office/drawing/2014/main" id="{B2074C59-0BD4-5846-856C-1D779A9402EF}"/>
+                <a16:creationId xmlns:a16="http://schemas.microsoft.com/office/drawing/2014/main" xmlns="" id="{B2074C59-0BD4-5846-856C-1D779A9402EF}"/>
               </a:ext>
             </a:extLst>
           </p:cNvPr>
@@ -2295,7 +2299,7 @@
           <p:cNvPr id="4" name="Text Placeholder 3">
             <a:extLst>
               <a:ext uri="{FF2B5EF4-FFF2-40B4-BE49-F238E27FC236}">
-                <a16:creationId xmlns:a16="http://schemas.microsoft.com/office/drawing/2014/main" id="{2C19C744-DB1F-3A4E-A1E5-257E6DC68FD6}"/>
+                <a16:creationId xmlns:a16="http://schemas.microsoft.com/office/drawing/2014/main" xmlns="" id="{2C19C744-DB1F-3A4E-A1E5-257E6DC68FD6}"/>
               </a:ext>
             </a:extLst>
           </p:cNvPr>
@@ -2366,7 +2370,7 @@
           <p:cNvPr id="5" name="Date Placeholder 4">
             <a:extLst>
               <a:ext uri="{FF2B5EF4-FFF2-40B4-BE49-F238E27FC236}">
-                <a16:creationId xmlns:a16="http://schemas.microsoft.com/office/drawing/2014/main" id="{90E5D466-214E-7745-AE08-8E72C0B7C618}"/>
+                <a16:creationId xmlns:a16="http://schemas.microsoft.com/office/drawing/2014/main" xmlns="" id="{90E5D466-214E-7745-AE08-8E72C0B7C618}"/>
               </a:ext>
             </a:extLst>
           </p:cNvPr>
@@ -2384,7 +2388,7 @@
           <a:p>
             <a:fld id="{636594A3-C46B-8D41-BF54-29191C81F9E8}" type="datetimeFigureOut">
               <a:rPr lang="en-US" smtClean="0"/>
-              <a:t>10/26/21</a:t>
+              <a:t>10/28/2021</a:t>
             </a:fld>
             <a:endParaRPr lang="en-US"/>
           </a:p>
@@ -2395,7 +2399,7 @@
           <p:cNvPr id="6" name="Footer Placeholder 5">
             <a:extLst>
               <a:ext uri="{FF2B5EF4-FFF2-40B4-BE49-F238E27FC236}">
-                <a16:creationId xmlns:a16="http://schemas.microsoft.com/office/drawing/2014/main" id="{30B40A87-84FA-9243-9893-F961D6813ED4}"/>
+                <a16:creationId xmlns:a16="http://schemas.microsoft.com/office/drawing/2014/main" xmlns="" id="{30B40A87-84FA-9243-9893-F961D6813ED4}"/>
               </a:ext>
             </a:extLst>
           </p:cNvPr>
@@ -2420,7 +2424,7 @@
           <p:cNvPr id="7" name="Slide Number Placeholder 6">
             <a:extLst>
               <a:ext uri="{FF2B5EF4-FFF2-40B4-BE49-F238E27FC236}">
-                <a16:creationId xmlns:a16="http://schemas.microsoft.com/office/drawing/2014/main" id="{DF326EF0-B028-5540-BD64-77589C554DDB}"/>
+                <a16:creationId xmlns:a16="http://schemas.microsoft.com/office/drawing/2014/main" xmlns="" id="{DF326EF0-B028-5540-BD64-77589C554DDB}"/>
               </a:ext>
             </a:extLst>
           </p:cNvPr>
@@ -2438,7 +2442,7 @@
           <a:p>
             <a:fld id="{6EEFBB86-C685-9B4A-9FB7-5ABC4E046DC9}" type="slidenum">
               <a:rPr lang="en-US" smtClean="0"/>
-              <a:t>‹#›</a:t>
+              <a:t>‹Nº›</a:t>
             </a:fld>
             <a:endParaRPr lang="en-US"/>
           </a:p>
@@ -2479,7 +2483,7 @@
           <p:cNvPr id="2" name="Title 1">
             <a:extLst>
               <a:ext uri="{FF2B5EF4-FFF2-40B4-BE49-F238E27FC236}">
-                <a16:creationId xmlns:a16="http://schemas.microsoft.com/office/drawing/2014/main" id="{DF4694D7-379B-0E44-82B8-72B28687DDE4}"/>
+                <a16:creationId xmlns:a16="http://schemas.microsoft.com/office/drawing/2014/main" xmlns="" id="{DF4694D7-379B-0E44-82B8-72B28687DDE4}"/>
               </a:ext>
             </a:extLst>
           </p:cNvPr>
@@ -2516,7 +2520,7 @@
           <p:cNvPr id="3" name="Picture Placeholder 2">
             <a:extLst>
               <a:ext uri="{FF2B5EF4-FFF2-40B4-BE49-F238E27FC236}">
-                <a16:creationId xmlns:a16="http://schemas.microsoft.com/office/drawing/2014/main" id="{75A8A267-947F-E441-8E1A-E53C6E0AAC58}"/>
+                <a16:creationId xmlns:a16="http://schemas.microsoft.com/office/drawing/2014/main" xmlns="" id="{75A8A267-947F-E441-8E1A-E53C6E0AAC58}"/>
               </a:ext>
             </a:extLst>
           </p:cNvPr>
@@ -2583,7 +2587,7 @@
           <p:cNvPr id="4" name="Text Placeholder 3">
             <a:extLst>
               <a:ext uri="{FF2B5EF4-FFF2-40B4-BE49-F238E27FC236}">
-                <a16:creationId xmlns:a16="http://schemas.microsoft.com/office/drawing/2014/main" id="{56E3DC28-5340-9940-87D1-63DEFA8C33CB}"/>
+                <a16:creationId xmlns:a16="http://schemas.microsoft.com/office/drawing/2014/main" xmlns="" id="{56E3DC28-5340-9940-87D1-63DEFA8C33CB}"/>
               </a:ext>
             </a:extLst>
           </p:cNvPr>
@@ -2654,7 +2658,7 @@
           <p:cNvPr id="5" name="Date Placeholder 4">
             <a:extLst>
               <a:ext uri="{FF2B5EF4-FFF2-40B4-BE49-F238E27FC236}">
-                <a16:creationId xmlns:a16="http://schemas.microsoft.com/office/drawing/2014/main" id="{8D405316-5CBB-294C-9D74-FB7B289A7EEF}"/>
+                <a16:creationId xmlns:a16="http://schemas.microsoft.com/office/drawing/2014/main" xmlns="" id="{8D405316-5CBB-294C-9D74-FB7B289A7EEF}"/>
               </a:ext>
             </a:extLst>
           </p:cNvPr>
@@ -2672,7 +2676,7 @@
           <a:p>
             <a:fld id="{636594A3-C46B-8D41-BF54-29191C81F9E8}" type="datetimeFigureOut">
               <a:rPr lang="en-US" smtClean="0"/>
-              <a:t>10/26/21</a:t>
+              <a:t>10/28/2021</a:t>
             </a:fld>
             <a:endParaRPr lang="en-US"/>
           </a:p>
@@ -2683,7 +2687,7 @@
           <p:cNvPr id="6" name="Footer Placeholder 5">
             <a:extLst>
               <a:ext uri="{FF2B5EF4-FFF2-40B4-BE49-F238E27FC236}">
-                <a16:creationId xmlns:a16="http://schemas.microsoft.com/office/drawing/2014/main" id="{248F1560-5BFA-7C48-9271-82426AFCC29D}"/>
+                <a16:creationId xmlns:a16="http://schemas.microsoft.com/office/drawing/2014/main" xmlns="" id="{248F1560-5BFA-7C48-9271-82426AFCC29D}"/>
               </a:ext>
             </a:extLst>
           </p:cNvPr>
@@ -2708,7 +2712,7 @@
           <p:cNvPr id="7" name="Slide Number Placeholder 6">
             <a:extLst>
               <a:ext uri="{FF2B5EF4-FFF2-40B4-BE49-F238E27FC236}">
-                <a16:creationId xmlns:a16="http://schemas.microsoft.com/office/drawing/2014/main" id="{33B66945-3EDA-F042-832F-1304991A7FE7}"/>
+                <a16:creationId xmlns:a16="http://schemas.microsoft.com/office/drawing/2014/main" xmlns="" id="{33B66945-3EDA-F042-832F-1304991A7FE7}"/>
               </a:ext>
             </a:extLst>
           </p:cNvPr>
@@ -2726,7 +2730,7 @@
           <a:p>
             <a:fld id="{6EEFBB86-C685-9B4A-9FB7-5ABC4E046DC9}" type="slidenum">
               <a:rPr lang="en-US" smtClean="0"/>
-              <a:t>‹#›</a:t>
+              <a:t>‹Nº›</a:t>
             </a:fld>
             <a:endParaRPr lang="en-US"/>
           </a:p>
@@ -2772,7 +2776,7 @@
           <p:cNvPr id="2" name="Title Placeholder 1">
             <a:extLst>
               <a:ext uri="{FF2B5EF4-FFF2-40B4-BE49-F238E27FC236}">
-                <a16:creationId xmlns:a16="http://schemas.microsoft.com/office/drawing/2014/main" id="{4D868E65-1A54-CF4F-9F02-DC402AFE5BA7}"/>
+                <a16:creationId xmlns:a16="http://schemas.microsoft.com/office/drawing/2014/main" xmlns="" id="{4D868E65-1A54-CF4F-9F02-DC402AFE5BA7}"/>
               </a:ext>
             </a:extLst>
           </p:cNvPr>
@@ -2810,7 +2814,7 @@
           <p:cNvPr id="3" name="Text Placeholder 2">
             <a:extLst>
               <a:ext uri="{FF2B5EF4-FFF2-40B4-BE49-F238E27FC236}">
-                <a16:creationId xmlns:a16="http://schemas.microsoft.com/office/drawing/2014/main" id="{7B194E6C-35D7-CF4F-AA09-E841207F73E5}"/>
+                <a16:creationId xmlns:a16="http://schemas.microsoft.com/office/drawing/2014/main" xmlns="" id="{7B194E6C-35D7-CF4F-AA09-E841207F73E5}"/>
               </a:ext>
             </a:extLst>
           </p:cNvPr>
@@ -2877,7 +2881,7 @@
           <p:cNvPr id="4" name="Date Placeholder 3">
             <a:extLst>
               <a:ext uri="{FF2B5EF4-FFF2-40B4-BE49-F238E27FC236}">
-                <a16:creationId xmlns:a16="http://schemas.microsoft.com/office/drawing/2014/main" id="{35435B69-B1B1-8147-AC01-28680A03CA2C}"/>
+                <a16:creationId xmlns:a16="http://schemas.microsoft.com/office/drawing/2014/main" xmlns="" id="{35435B69-B1B1-8147-AC01-28680A03CA2C}"/>
               </a:ext>
             </a:extLst>
           </p:cNvPr>
@@ -2913,7 +2917,7 @@
           <a:p>
             <a:fld id="{636594A3-C46B-8D41-BF54-29191C81F9E8}" type="datetimeFigureOut">
               <a:rPr lang="en-US" smtClean="0"/>
-              <a:t>10/26/21</a:t>
+              <a:t>10/28/2021</a:t>
             </a:fld>
             <a:endParaRPr lang="en-US"/>
           </a:p>
@@ -2924,7 +2928,7 @@
           <p:cNvPr id="5" name="Footer Placeholder 4">
             <a:extLst>
               <a:ext uri="{FF2B5EF4-FFF2-40B4-BE49-F238E27FC236}">
-                <a16:creationId xmlns:a16="http://schemas.microsoft.com/office/drawing/2014/main" id="{BD659F6A-008D-2148-8F0F-62597A344D33}"/>
+                <a16:creationId xmlns:a16="http://schemas.microsoft.com/office/drawing/2014/main" xmlns="" id="{BD659F6A-008D-2148-8F0F-62597A344D33}"/>
               </a:ext>
             </a:extLst>
           </p:cNvPr>
@@ -2967,7 +2971,7 @@
           <p:cNvPr id="6" name="Slide Number Placeholder 5">
             <a:extLst>
               <a:ext uri="{FF2B5EF4-FFF2-40B4-BE49-F238E27FC236}">
-                <a16:creationId xmlns:a16="http://schemas.microsoft.com/office/drawing/2014/main" id="{D5EA6F3B-8CEA-3644-804E-A4619B7B8DE8}"/>
+                <a16:creationId xmlns:a16="http://schemas.microsoft.com/office/drawing/2014/main" xmlns="" id="{D5EA6F3B-8CEA-3644-804E-A4619B7B8DE8}"/>
               </a:ext>
             </a:extLst>
           </p:cNvPr>
@@ -3003,7 +3007,7 @@
           <a:p>
             <a:fld id="{6EEFBB86-C685-9B4A-9FB7-5ABC4E046DC9}" type="slidenum">
               <a:rPr lang="en-US" smtClean="0"/>
-              <a:t>‹#›</a:t>
+              <a:t>‹Nº›</a:t>
             </a:fld>
             <a:endParaRPr lang="en-US"/>
           </a:p>
@@ -3216,7 +3220,7 @@
     </p:bodyStyle>
     <p:otherStyle>
       <a:defPPr>
-        <a:defRPr lang="en-CL"/>
+        <a:defRPr lang="x-none"/>
       </a:defPPr>
       <a:lvl1pPr marL="0" algn="l" defTabSz="914400" rtl="0" eaLnBrk="1" latinLnBrk="0" hangingPunct="1">
         <a:defRPr sz="1800" kern="1200">
@@ -3335,7 +3339,7 @@
           <p:cNvPr id="3" name="Picture 2">
             <a:extLst>
               <a:ext uri="{FF2B5EF4-FFF2-40B4-BE49-F238E27FC236}">
-                <a16:creationId xmlns:a16="http://schemas.microsoft.com/office/drawing/2014/main" id="{56297C8F-DA7E-E14D-B31B-C20949D04D56}"/>
+                <a16:creationId xmlns:a16="http://schemas.microsoft.com/office/drawing/2014/main" xmlns="" id="{56297C8F-DA7E-E14D-B31B-C20949D04D56}"/>
               </a:ext>
             </a:extLst>
           </p:cNvPr>
@@ -3365,7 +3369,7 @@
           <p:cNvPr id="6" name="Picture 5">
             <a:extLst>
               <a:ext uri="{FF2B5EF4-FFF2-40B4-BE49-F238E27FC236}">
-                <a16:creationId xmlns:a16="http://schemas.microsoft.com/office/drawing/2014/main" id="{7869C27C-6746-D740-B1E4-2896B4A7F1AE}"/>
+                <a16:creationId xmlns:a16="http://schemas.microsoft.com/office/drawing/2014/main" xmlns="" id="{7869C27C-6746-D740-B1E4-2896B4A7F1AE}"/>
               </a:ext>
             </a:extLst>
           </p:cNvPr>
@@ -3395,7 +3399,7 @@
           <p:cNvPr id="5" name="Picture 4">
             <a:extLst>
               <a:ext uri="{FF2B5EF4-FFF2-40B4-BE49-F238E27FC236}">
-                <a16:creationId xmlns:a16="http://schemas.microsoft.com/office/drawing/2014/main" id="{E3163627-6D5A-554C-A441-6156CE28B68A}"/>
+                <a16:creationId xmlns:a16="http://schemas.microsoft.com/office/drawing/2014/main" xmlns="" id="{E3163627-6D5A-554C-A441-6156CE28B68A}"/>
               </a:ext>
             </a:extLst>
           </p:cNvPr>
@@ -3424,7 +3428,7 @@
           <p:cNvPr id="7" name="Picture 6">
             <a:extLst>
               <a:ext uri="{FF2B5EF4-FFF2-40B4-BE49-F238E27FC236}">
-                <a16:creationId xmlns:a16="http://schemas.microsoft.com/office/drawing/2014/main" id="{7E0D9E8F-A890-6643-9613-BB7283B924ED}"/>
+                <a16:creationId xmlns:a16="http://schemas.microsoft.com/office/drawing/2014/main" xmlns="" id="{7E0D9E8F-A890-6643-9613-BB7283B924ED}"/>
               </a:ext>
             </a:extLst>
           </p:cNvPr>
@@ -3483,7 +3487,7 @@
           <p:cNvPr id="5" name="Picture 4">
             <a:extLst>
               <a:ext uri="{FF2B5EF4-FFF2-40B4-BE49-F238E27FC236}">
-                <a16:creationId xmlns:a16="http://schemas.microsoft.com/office/drawing/2014/main" id="{E3163627-6D5A-554C-A441-6156CE28B68A}"/>
+                <a16:creationId xmlns:a16="http://schemas.microsoft.com/office/drawing/2014/main" xmlns="" id="{E3163627-6D5A-554C-A441-6156CE28B68A}"/>
               </a:ext>
             </a:extLst>
           </p:cNvPr>
@@ -3512,7 +3516,7 @@
           <p:cNvPr id="7" name="Picture 6">
             <a:extLst>
               <a:ext uri="{FF2B5EF4-FFF2-40B4-BE49-F238E27FC236}">
-                <a16:creationId xmlns:a16="http://schemas.microsoft.com/office/drawing/2014/main" id="{7E0D9E8F-A890-6643-9613-BB7283B924ED}"/>
+                <a16:creationId xmlns:a16="http://schemas.microsoft.com/office/drawing/2014/main" xmlns="" id="{7E0D9E8F-A890-6643-9613-BB7283B924ED}"/>
               </a:ext>
             </a:extLst>
           </p:cNvPr>
@@ -3541,7 +3545,7 @@
           <p:cNvPr id="2" name="TextBox 1">
             <a:extLst>
               <a:ext uri="{FF2B5EF4-FFF2-40B4-BE49-F238E27FC236}">
-                <a16:creationId xmlns:a16="http://schemas.microsoft.com/office/drawing/2014/main" id="{0145ED7C-6101-834A-91B4-462ACD98029A}"/>
+                <a16:creationId xmlns:a16="http://schemas.microsoft.com/office/drawing/2014/main" xmlns="" id="{0145ED7C-6101-834A-91B4-462ACD98029A}"/>
               </a:ext>
             </a:extLst>
           </p:cNvPr>
@@ -3706,7 +3710,7 @@
           <p:cNvPr id="3" name="TextBox 2">
             <a:extLst>
               <a:ext uri="{FF2B5EF4-FFF2-40B4-BE49-F238E27FC236}">
-                <a16:creationId xmlns:a16="http://schemas.microsoft.com/office/drawing/2014/main" id="{1E395313-937B-E14C-94C4-9B3A8455B93F}"/>
+                <a16:creationId xmlns:a16="http://schemas.microsoft.com/office/drawing/2014/main" xmlns="" id="{1E395313-937B-E14C-94C4-9B3A8455B93F}"/>
               </a:ext>
             </a:extLst>
           </p:cNvPr>
@@ -3892,7 +3896,7 @@
           <p:cNvPr id="6" name="Picture 5" descr="Black and white spiralling staircase">
             <a:extLst>
               <a:ext uri="{FF2B5EF4-FFF2-40B4-BE49-F238E27FC236}">
-                <a16:creationId xmlns:a16="http://schemas.microsoft.com/office/drawing/2014/main" id="{198B97D4-FFCF-C249-84F6-43C85F0E16B1}"/>
+                <a16:creationId xmlns:a16="http://schemas.microsoft.com/office/drawing/2014/main" xmlns="" id="{198B97D4-FFCF-C249-84F6-43C85F0E16B1}"/>
               </a:ext>
             </a:extLst>
           </p:cNvPr>
@@ -3952,7 +3956,7 @@
           <p:cNvPr id="5" name="Picture 4">
             <a:extLst>
               <a:ext uri="{FF2B5EF4-FFF2-40B4-BE49-F238E27FC236}">
-                <a16:creationId xmlns:a16="http://schemas.microsoft.com/office/drawing/2014/main" id="{E3163627-6D5A-554C-A441-6156CE28B68A}"/>
+                <a16:creationId xmlns:a16="http://schemas.microsoft.com/office/drawing/2014/main" xmlns="" id="{E3163627-6D5A-554C-A441-6156CE28B68A}"/>
               </a:ext>
             </a:extLst>
           </p:cNvPr>
@@ -3981,7 +3985,7 @@
           <p:cNvPr id="7" name="Picture 6">
             <a:extLst>
               <a:ext uri="{FF2B5EF4-FFF2-40B4-BE49-F238E27FC236}">
-                <a16:creationId xmlns:a16="http://schemas.microsoft.com/office/drawing/2014/main" id="{7E0D9E8F-A890-6643-9613-BB7283B924ED}"/>
+                <a16:creationId xmlns:a16="http://schemas.microsoft.com/office/drawing/2014/main" xmlns="" id="{7E0D9E8F-A890-6643-9613-BB7283B924ED}"/>
               </a:ext>
             </a:extLst>
           </p:cNvPr>
@@ -4010,7 +4014,7 @@
           <p:cNvPr id="2" name="TextBox 1">
             <a:extLst>
               <a:ext uri="{FF2B5EF4-FFF2-40B4-BE49-F238E27FC236}">
-                <a16:creationId xmlns:a16="http://schemas.microsoft.com/office/drawing/2014/main" id="{0145ED7C-6101-834A-91B4-462ACD98029A}"/>
+                <a16:creationId xmlns:a16="http://schemas.microsoft.com/office/drawing/2014/main" xmlns="" id="{0145ED7C-6101-834A-91B4-462ACD98029A}"/>
               </a:ext>
             </a:extLst>
           </p:cNvPr>
@@ -4175,7 +4179,7 @@
           <p:cNvPr id="3" name="TextBox 2">
             <a:extLst>
               <a:ext uri="{FF2B5EF4-FFF2-40B4-BE49-F238E27FC236}">
-                <a16:creationId xmlns:a16="http://schemas.microsoft.com/office/drawing/2014/main" id="{1E395313-937B-E14C-94C4-9B3A8455B93F}"/>
+                <a16:creationId xmlns:a16="http://schemas.microsoft.com/office/drawing/2014/main" xmlns="" id="{1E395313-937B-E14C-94C4-9B3A8455B93F}"/>
               </a:ext>
             </a:extLst>
           </p:cNvPr>
@@ -4185,7 +4189,7 @@
         <p:spPr>
           <a:xfrm>
             <a:off x="639191" y="2254927"/>
-            <a:ext cx="10922188" cy="1384995"/>
+            <a:ext cx="10922188" cy="3970318"/>
           </a:xfrm>
           <a:prstGeom prst="rect">
             <a:avLst/>
@@ -4224,20 +4228,326 @@
           <a:p>
             <a:pPr algn="just"/>
             <a:r>
+              <a:rPr lang="en-US" sz="2400" dirty="0" smtClean="0">
+                <a:solidFill>
+                  <a:srgbClr val="0A183B"/>
+                </a:solidFill>
+              </a:rPr>
+              <a:t>El Nuevo </a:t>
+            </a:r>
+            <a:r>
+              <a:rPr lang="en-US" sz="2400" dirty="0" err="1" smtClean="0">
+                <a:solidFill>
+                  <a:srgbClr val="0A183B"/>
+                </a:solidFill>
+              </a:rPr>
+              <a:t>escenario</a:t>
+            </a:r>
+            <a:r>
+              <a:rPr lang="en-US" sz="2400" dirty="0" smtClean="0">
+                <a:solidFill>
+                  <a:srgbClr val="0A183B"/>
+                </a:solidFill>
+              </a:rPr>
+              <a:t> </a:t>
+            </a:r>
+            <a:r>
+              <a:rPr lang="en-US" sz="2400" dirty="0" err="1" smtClean="0">
+                <a:solidFill>
+                  <a:srgbClr val="0A183B"/>
+                </a:solidFill>
+              </a:rPr>
+              <a:t>educativo</a:t>
+            </a:r>
+            <a:r>
+              <a:rPr lang="en-US" sz="2400" dirty="0" smtClean="0">
+                <a:solidFill>
+                  <a:srgbClr val="0A183B"/>
+                </a:solidFill>
+              </a:rPr>
+              <a:t> </a:t>
+            </a:r>
+          </a:p>
+          <a:p>
+            <a:pPr marL="342900" indent="-342900" algn="just">
+              <a:buFont typeface="Arial" panose="020B0604020202020204" pitchFamily="34" charset="0"/>
+              <a:buChar char="•"/>
+            </a:pPr>
+            <a:r>
+              <a:rPr lang="en-US" sz="2400" dirty="0" err="1" smtClean="0">
+                <a:solidFill>
+                  <a:srgbClr val="0A183B"/>
+                </a:solidFill>
+              </a:rPr>
+              <a:t>Rediseñar</a:t>
+            </a:r>
+            <a:endParaRPr lang="en-US" sz="2400" dirty="0" smtClean="0">
+              <a:solidFill>
+                <a:srgbClr val="0A183B"/>
+              </a:solidFill>
+            </a:endParaRPr>
+          </a:p>
+          <a:p>
+            <a:pPr marL="800100" lvl="1" indent="-342900" algn="just">
+              <a:buFont typeface="Arial" panose="020B0604020202020204" pitchFamily="34" charset="0"/>
+              <a:buChar char="•"/>
+            </a:pPr>
+            <a:r>
+              <a:rPr lang="en-US" sz="2400" dirty="0" err="1" smtClean="0">
+                <a:solidFill>
+                  <a:srgbClr val="0A183B"/>
+                </a:solidFill>
+              </a:rPr>
+              <a:t>Metas</a:t>
+            </a:r>
+            <a:r>
+              <a:rPr lang="en-US" sz="2400" dirty="0" smtClean="0">
+                <a:solidFill>
+                  <a:srgbClr val="0A183B"/>
+                </a:solidFill>
+              </a:rPr>
+              <a:t> </a:t>
+            </a:r>
+            <a:r>
+              <a:rPr lang="en-US" sz="2400" dirty="0" err="1" smtClean="0">
+                <a:solidFill>
+                  <a:srgbClr val="0A183B"/>
+                </a:solidFill>
+              </a:rPr>
+              <a:t>instruccionales</a:t>
+            </a:r>
+            <a:endParaRPr lang="en-US" sz="2400" dirty="0" smtClean="0">
+              <a:solidFill>
+                <a:srgbClr val="0A183B"/>
+              </a:solidFill>
+            </a:endParaRPr>
+          </a:p>
+          <a:p>
+            <a:pPr marL="800100" lvl="1" indent="-342900" algn="just">
+              <a:buFont typeface="Arial" panose="020B0604020202020204" pitchFamily="34" charset="0"/>
+              <a:buChar char="•"/>
+            </a:pPr>
+            <a:r>
+              <a:rPr lang="en-US" sz="2400" dirty="0" err="1" smtClean="0">
+                <a:solidFill>
+                  <a:srgbClr val="0A183B"/>
+                </a:solidFill>
+              </a:rPr>
+              <a:t>Materiales</a:t>
+            </a:r>
+            <a:endParaRPr lang="en-US" sz="2400" dirty="0" smtClean="0">
+              <a:solidFill>
+                <a:srgbClr val="0A183B"/>
+              </a:solidFill>
+            </a:endParaRPr>
+          </a:p>
+          <a:p>
+            <a:pPr marL="800100" lvl="1" indent="-342900" algn="just">
+              <a:buFont typeface="Arial" panose="020B0604020202020204" pitchFamily="34" charset="0"/>
+              <a:buChar char="•"/>
+            </a:pPr>
+            <a:r>
+              <a:rPr lang="en-US" sz="2400" dirty="0" err="1" smtClean="0">
+                <a:solidFill>
+                  <a:srgbClr val="0A183B"/>
+                </a:solidFill>
+              </a:rPr>
+              <a:t>Métodos</a:t>
+            </a:r>
+            <a:endParaRPr lang="en-US" sz="2400" dirty="0" smtClean="0">
+              <a:solidFill>
+                <a:srgbClr val="0A183B"/>
+              </a:solidFill>
+            </a:endParaRPr>
+          </a:p>
+          <a:p>
+            <a:pPr marL="800100" lvl="1" indent="-342900" algn="just">
+              <a:buFont typeface="Arial" panose="020B0604020202020204" pitchFamily="34" charset="0"/>
+              <a:buChar char="•"/>
+            </a:pPr>
+            <a:r>
+              <a:rPr lang="en-US" sz="2400" dirty="0" err="1" smtClean="0">
+                <a:solidFill>
+                  <a:srgbClr val="0A183B"/>
+                </a:solidFill>
+              </a:rPr>
+              <a:t>Evaluación</a:t>
+            </a:r>
+            <a:endParaRPr lang="en-US" sz="2400" dirty="0">
+              <a:solidFill>
+                <a:srgbClr val="0A183B"/>
+              </a:solidFill>
+            </a:endParaRPr>
+          </a:p>
+          <a:p>
+            <a:pPr marL="342900" indent="-342900" algn="just">
+              <a:buFont typeface="Arial" panose="020B0604020202020204" pitchFamily="34" charset="0"/>
+              <a:buChar char="•"/>
+            </a:pPr>
+            <a:r>
+              <a:rPr lang="en-US" sz="2400" dirty="0" err="1" smtClean="0">
+                <a:solidFill>
+                  <a:srgbClr val="0A183B"/>
+                </a:solidFill>
+              </a:rPr>
+              <a:t>Propuesta</a:t>
+            </a:r>
+            <a:r>
+              <a:rPr lang="en-US" sz="2400" dirty="0" smtClean="0">
+                <a:solidFill>
+                  <a:srgbClr val="0A183B"/>
+                </a:solidFill>
+              </a:rPr>
+              <a:t> </a:t>
+            </a:r>
+            <a:r>
+              <a:rPr lang="en-US" sz="2400" dirty="0" err="1" smtClean="0">
+                <a:solidFill>
+                  <a:srgbClr val="0A183B"/>
+                </a:solidFill>
+              </a:rPr>
+              <a:t>situada</a:t>
+            </a:r>
+            <a:r>
+              <a:rPr lang="en-US" sz="2400" dirty="0" smtClean="0">
+                <a:solidFill>
+                  <a:srgbClr val="0A183B"/>
+                </a:solidFill>
+              </a:rPr>
+              <a:t>: </a:t>
+            </a:r>
+            <a:r>
+              <a:rPr lang="en-US" sz="2400" dirty="0" err="1" smtClean="0">
+                <a:solidFill>
+                  <a:srgbClr val="0A183B"/>
+                </a:solidFill>
+              </a:rPr>
+              <a:t>tiempo</a:t>
+            </a:r>
+            <a:r>
+              <a:rPr lang="en-US" sz="2400" dirty="0" smtClean="0">
+                <a:solidFill>
+                  <a:srgbClr val="0A183B"/>
+                </a:solidFill>
+              </a:rPr>
+              <a:t>, </a:t>
+            </a:r>
+            <a:r>
+              <a:rPr lang="en-US" sz="2400" dirty="0" err="1" smtClean="0">
+                <a:solidFill>
+                  <a:srgbClr val="0A183B"/>
+                </a:solidFill>
+              </a:rPr>
+              <a:t>lugar</a:t>
+            </a:r>
+            <a:r>
+              <a:rPr lang="en-US" sz="2400" dirty="0" smtClean="0">
+                <a:solidFill>
+                  <a:srgbClr val="0A183B"/>
+                </a:solidFill>
+              </a:rPr>
+              <a:t>, </a:t>
+            </a:r>
+            <a:r>
+              <a:rPr lang="en-US" sz="2400" dirty="0" err="1" smtClean="0">
+                <a:solidFill>
+                  <a:srgbClr val="0A183B"/>
+                </a:solidFill>
+              </a:rPr>
+              <a:t>condiciones</a:t>
+            </a:r>
+            <a:r>
+              <a:rPr lang="en-US" sz="2400" dirty="0" smtClean="0">
+                <a:solidFill>
+                  <a:srgbClr val="0A183B"/>
+                </a:solidFill>
+              </a:rPr>
+              <a:t> </a:t>
+            </a:r>
+            <a:r>
+              <a:rPr lang="en-US" sz="2400" dirty="0" err="1" smtClean="0">
+                <a:solidFill>
+                  <a:srgbClr val="0A183B"/>
+                </a:solidFill>
+              </a:rPr>
+              <a:t>materiales</a:t>
+            </a:r>
+            <a:r>
               <a:rPr lang="en-US" sz="2400" dirty="0">
                 <a:solidFill>
                   <a:srgbClr val="0A183B"/>
                 </a:solidFill>
               </a:rPr>
-              <a:t>Lorem Ipsum...</a:t>
-            </a:r>
+              <a:t>-</a:t>
+            </a:r>
+            <a:r>
+              <a:rPr lang="en-US" sz="2400" dirty="0" smtClean="0">
+                <a:solidFill>
+                  <a:srgbClr val="0A183B"/>
+                </a:solidFill>
+              </a:rPr>
+              <a:t> </a:t>
+            </a:r>
+            <a:r>
+              <a:rPr lang="en-US" sz="2400" dirty="0" err="1" smtClean="0">
+                <a:solidFill>
+                  <a:srgbClr val="0A183B"/>
+                </a:solidFill>
+              </a:rPr>
+              <a:t>pedagógicas</a:t>
+            </a:r>
+            <a:r>
+              <a:rPr lang="en-US" sz="2400" dirty="0" smtClean="0">
+                <a:solidFill>
+                  <a:srgbClr val="0A183B"/>
+                </a:solidFill>
+              </a:rPr>
+              <a:t>- </a:t>
+            </a:r>
+            <a:r>
+              <a:rPr lang="en-US" sz="2400" dirty="0" err="1" smtClean="0">
+                <a:solidFill>
+                  <a:srgbClr val="0A183B"/>
+                </a:solidFill>
+              </a:rPr>
+              <a:t>tecnológicas</a:t>
+            </a:r>
+            <a:r>
+              <a:rPr lang="en-US" sz="2400" dirty="0">
+                <a:solidFill>
+                  <a:srgbClr val="0A183B"/>
+                </a:solidFill>
+              </a:rPr>
+              <a:t> </a:t>
+            </a:r>
+            <a:r>
+              <a:rPr lang="en-US" sz="2400" dirty="0" smtClean="0">
+                <a:solidFill>
+                  <a:srgbClr val="0A183B"/>
+                </a:solidFill>
+              </a:rPr>
+              <a:t>y </a:t>
+            </a:r>
+            <a:r>
+              <a:rPr lang="en-US" sz="2400" dirty="0" err="1" smtClean="0">
+                <a:solidFill>
+                  <a:srgbClr val="0A183B"/>
+                </a:solidFill>
+              </a:rPr>
+              <a:t>culturales</a:t>
+            </a:r>
+            <a:endParaRPr lang="en-US" sz="2400" dirty="0" smtClean="0">
+              <a:solidFill>
+                <a:srgbClr val="0A183B"/>
+              </a:solidFill>
+            </a:endParaRPr>
           </a:p>
         </p:txBody>
       </p:sp>
     </p:spTree>
     <p:extLst>
       <p:ext uri="{BB962C8B-B14F-4D97-AF65-F5344CB8AC3E}">
-        <p14:creationId xmlns:p14="http://schemas.microsoft.com/office/powerpoint/2010/main" val="2570885902"/>
+        <p14:creationId xmlns:p14="http://schemas.microsoft.com/office/powerpoint/2010/main" val="119259899"/>
       </p:ext>
     </p:extLst>
   </p:cSld>
@@ -4269,7 +4579,7 @@
           <p:cNvPr id="5" name="Picture 4">
             <a:extLst>
               <a:ext uri="{FF2B5EF4-FFF2-40B4-BE49-F238E27FC236}">
-                <a16:creationId xmlns:a16="http://schemas.microsoft.com/office/drawing/2014/main" id="{E3163627-6D5A-554C-A441-6156CE28B68A}"/>
+                <a16:creationId xmlns:a16="http://schemas.microsoft.com/office/drawing/2014/main" xmlns="" id="{E3163627-6D5A-554C-A441-6156CE28B68A}"/>
               </a:ext>
             </a:extLst>
           </p:cNvPr>
@@ -4298,7 +4608,7 @@
           <p:cNvPr id="7" name="Picture 6">
             <a:extLst>
               <a:ext uri="{FF2B5EF4-FFF2-40B4-BE49-F238E27FC236}">
-                <a16:creationId xmlns:a16="http://schemas.microsoft.com/office/drawing/2014/main" id="{7E0D9E8F-A890-6643-9613-BB7283B924ED}"/>
+                <a16:creationId xmlns:a16="http://schemas.microsoft.com/office/drawing/2014/main" xmlns="" id="{7E0D9E8F-A890-6643-9613-BB7283B924ED}"/>
               </a:ext>
             </a:extLst>
           </p:cNvPr>
@@ -4327,7 +4637,7 @@
           <p:cNvPr id="2" name="TextBox 1">
             <a:extLst>
               <a:ext uri="{FF2B5EF4-FFF2-40B4-BE49-F238E27FC236}">
-                <a16:creationId xmlns:a16="http://schemas.microsoft.com/office/drawing/2014/main" id="{0145ED7C-6101-834A-91B4-462ACD98029A}"/>
+                <a16:creationId xmlns:a16="http://schemas.microsoft.com/office/drawing/2014/main" xmlns="" id="{0145ED7C-6101-834A-91B4-462ACD98029A}"/>
               </a:ext>
             </a:extLst>
           </p:cNvPr>
@@ -4492,7 +4802,7 @@
           <p:cNvPr id="3" name="TextBox 2">
             <a:extLst>
               <a:ext uri="{FF2B5EF4-FFF2-40B4-BE49-F238E27FC236}">
-                <a16:creationId xmlns:a16="http://schemas.microsoft.com/office/drawing/2014/main" id="{1E395313-937B-E14C-94C4-9B3A8455B93F}"/>
+                <a16:creationId xmlns:a16="http://schemas.microsoft.com/office/drawing/2014/main" xmlns="" id="{1E395313-937B-E14C-94C4-9B3A8455B93F}"/>
               </a:ext>
             </a:extLst>
           </p:cNvPr>
@@ -4502,7 +4812,7 @@
         <p:spPr>
           <a:xfrm>
             <a:off x="639191" y="2254927"/>
-            <a:ext cx="10922188" cy="1384995"/>
+            <a:ext cx="10922188" cy="2492990"/>
           </a:xfrm>
           <a:prstGeom prst="rect">
             <a:avLst/>
@@ -4541,13 +4851,230 @@
           <a:p>
             <a:pPr algn="just"/>
             <a:r>
-              <a:rPr lang="en-US" sz="2400" dirty="0">
-                <a:solidFill>
-                  <a:srgbClr val="0A183B"/>
-                </a:solidFill>
-              </a:rPr>
-              <a:t>Lorem Ipsum...</a:t>
-            </a:r>
+              <a:rPr lang="en-US" sz="2400" dirty="0" smtClean="0">
+                <a:solidFill>
+                  <a:srgbClr val="0A183B"/>
+                </a:solidFill>
+              </a:rPr>
+              <a:t>Los </a:t>
+            </a:r>
+            <a:r>
+              <a:rPr lang="en-US" sz="2400" dirty="0" err="1" smtClean="0">
+                <a:solidFill>
+                  <a:srgbClr val="0A183B"/>
+                </a:solidFill>
+              </a:rPr>
+              <a:t>sujetos</a:t>
+            </a:r>
+            <a:r>
+              <a:rPr lang="en-US" sz="2400" dirty="0" smtClean="0">
+                <a:solidFill>
+                  <a:srgbClr val="0A183B"/>
+                </a:solidFill>
+              </a:rPr>
+              <a:t> que </a:t>
+            </a:r>
+            <a:r>
+              <a:rPr lang="en-US" sz="2400" dirty="0" err="1" smtClean="0">
+                <a:solidFill>
+                  <a:srgbClr val="0A183B"/>
+                </a:solidFill>
+              </a:rPr>
+              <a:t>aprenden</a:t>
+            </a:r>
+            <a:endParaRPr lang="en-US" sz="2400" dirty="0">
+              <a:solidFill>
+                <a:srgbClr val="0A183B"/>
+              </a:solidFill>
+            </a:endParaRPr>
+          </a:p>
+          <a:p>
+            <a:pPr marL="342900" indent="-342900" algn="just">
+              <a:buFont typeface="Arial" panose="020B0604020202020204" pitchFamily="34" charset="0"/>
+              <a:buChar char="•"/>
+            </a:pPr>
+            <a:r>
+              <a:rPr lang="en-US" sz="2400" dirty="0" err="1" smtClean="0">
+                <a:solidFill>
+                  <a:srgbClr val="0A183B"/>
+                </a:solidFill>
+              </a:rPr>
+              <a:t>Formas</a:t>
+            </a:r>
+            <a:r>
+              <a:rPr lang="en-US" sz="2400" dirty="0" smtClean="0">
+                <a:solidFill>
+                  <a:srgbClr val="0A183B"/>
+                </a:solidFill>
+              </a:rPr>
+              <a:t> de </a:t>
+            </a:r>
+            <a:r>
+              <a:rPr lang="en-US" sz="2400" dirty="0" err="1" smtClean="0">
+                <a:solidFill>
+                  <a:srgbClr val="0A183B"/>
+                </a:solidFill>
+              </a:rPr>
+              <a:t>ser</a:t>
+            </a:r>
+            <a:r>
+              <a:rPr lang="en-US" sz="2400" dirty="0" smtClean="0">
+                <a:solidFill>
+                  <a:srgbClr val="0A183B"/>
+                </a:solidFill>
+              </a:rPr>
+              <a:t> “</a:t>
+            </a:r>
+            <a:r>
+              <a:rPr lang="en-US" sz="2400" dirty="0" err="1" smtClean="0">
+                <a:solidFill>
+                  <a:srgbClr val="0A183B"/>
+                </a:solidFill>
+              </a:rPr>
+              <a:t>inteligente</a:t>
+            </a:r>
+            <a:r>
+              <a:rPr lang="en-US" sz="2400" dirty="0" smtClean="0">
+                <a:solidFill>
+                  <a:srgbClr val="0A183B"/>
+                </a:solidFill>
+              </a:rPr>
+              <a:t>”</a:t>
+            </a:r>
+          </a:p>
+          <a:p>
+            <a:pPr marL="800100" lvl="1" indent="-342900" algn="just">
+              <a:buFont typeface="Arial" panose="020B0604020202020204" pitchFamily="34" charset="0"/>
+              <a:buChar char="•"/>
+            </a:pPr>
+            <a:r>
+              <a:rPr lang="en-US" sz="2400" dirty="0" err="1" smtClean="0">
+                <a:solidFill>
+                  <a:srgbClr val="0A183B"/>
+                </a:solidFill>
+              </a:rPr>
+              <a:t>Cinestésicos</a:t>
+            </a:r>
+            <a:r>
+              <a:rPr lang="en-US" sz="2400" dirty="0" smtClean="0">
+                <a:solidFill>
+                  <a:srgbClr val="0A183B"/>
+                </a:solidFill>
+              </a:rPr>
+              <a:t>- </a:t>
+            </a:r>
+            <a:r>
+              <a:rPr lang="en-US" sz="2400" dirty="0" err="1" smtClean="0">
+                <a:solidFill>
+                  <a:srgbClr val="0A183B"/>
+                </a:solidFill>
+              </a:rPr>
+              <a:t>visuales</a:t>
+            </a:r>
+            <a:r>
+              <a:rPr lang="en-US" sz="2400" dirty="0" smtClean="0">
+                <a:solidFill>
+                  <a:srgbClr val="0A183B"/>
+                </a:solidFill>
+              </a:rPr>
+              <a:t>- </a:t>
+            </a:r>
+            <a:r>
+              <a:rPr lang="en-US" sz="2400" dirty="0" err="1" smtClean="0">
+                <a:solidFill>
+                  <a:srgbClr val="0A183B"/>
+                </a:solidFill>
+              </a:rPr>
+              <a:t>auditivos</a:t>
+            </a:r>
+            <a:r>
+              <a:rPr lang="en-US" sz="2400" dirty="0" smtClean="0">
+                <a:solidFill>
+                  <a:srgbClr val="0A183B"/>
+                </a:solidFill>
+              </a:rPr>
+              <a:t>; </a:t>
+            </a:r>
+            <a:r>
+              <a:rPr lang="en-US" sz="2400" dirty="0" err="1" smtClean="0">
+                <a:solidFill>
+                  <a:srgbClr val="0A183B"/>
+                </a:solidFill>
+              </a:rPr>
+              <a:t>sensaciones</a:t>
+            </a:r>
+            <a:r>
+              <a:rPr lang="en-US" sz="2400" dirty="0" smtClean="0">
+                <a:solidFill>
+                  <a:srgbClr val="0A183B"/>
+                </a:solidFill>
+              </a:rPr>
+              <a:t>- </a:t>
+            </a:r>
+            <a:r>
+              <a:rPr lang="en-US" sz="2400" dirty="0" err="1" smtClean="0">
+                <a:solidFill>
+                  <a:srgbClr val="0A183B"/>
+                </a:solidFill>
+              </a:rPr>
+              <a:t>emociones</a:t>
+            </a:r>
+            <a:endParaRPr lang="en-US" sz="2400" dirty="0" smtClean="0">
+              <a:solidFill>
+                <a:srgbClr val="0A183B"/>
+              </a:solidFill>
+            </a:endParaRPr>
+          </a:p>
+          <a:p>
+            <a:pPr marL="342900" indent="-342900" algn="just">
+              <a:buFont typeface="Arial" panose="020B0604020202020204" pitchFamily="34" charset="0"/>
+              <a:buChar char="•"/>
+            </a:pPr>
+            <a:r>
+              <a:rPr lang="en-US" sz="2400" dirty="0" err="1" smtClean="0">
+                <a:solidFill>
+                  <a:srgbClr val="0A183B"/>
+                </a:solidFill>
+              </a:rPr>
+              <a:t>Gaminficación</a:t>
+            </a:r>
+            <a:r>
+              <a:rPr lang="en-US" sz="2400" dirty="0" smtClean="0">
+                <a:solidFill>
+                  <a:srgbClr val="0A183B"/>
+                </a:solidFill>
+              </a:rPr>
+              <a:t>: </a:t>
+            </a:r>
+            <a:r>
+              <a:rPr lang="en-US" sz="2400" dirty="0" err="1" smtClean="0">
+                <a:solidFill>
+                  <a:srgbClr val="0A183B"/>
+                </a:solidFill>
+              </a:rPr>
+              <a:t>Enseñanza</a:t>
+            </a:r>
+            <a:r>
+              <a:rPr lang="en-US" sz="2400" dirty="0" smtClean="0">
+                <a:solidFill>
+                  <a:srgbClr val="0A183B"/>
+                </a:solidFill>
+              </a:rPr>
+              <a:t> </a:t>
+            </a:r>
+            <a:r>
+              <a:rPr lang="en-US" sz="2400" dirty="0" err="1" smtClean="0">
+                <a:solidFill>
+                  <a:srgbClr val="0A183B"/>
+                </a:solidFill>
+              </a:rPr>
+              <a:t>Inmersiva</a:t>
+            </a:r>
+            <a:endParaRPr lang="en-US" sz="2400" dirty="0">
+              <a:solidFill>
+                <a:srgbClr val="0A183B"/>
+              </a:solidFill>
+            </a:endParaRPr>
           </a:p>
         </p:txBody>
       </p:sp>
@@ -4586,7 +5113,7 @@
           <p:cNvPr id="5" name="Picture 4">
             <a:extLst>
               <a:ext uri="{FF2B5EF4-FFF2-40B4-BE49-F238E27FC236}">
-                <a16:creationId xmlns:a16="http://schemas.microsoft.com/office/drawing/2014/main" id="{E3163627-6D5A-554C-A441-6156CE28B68A}"/>
+                <a16:creationId xmlns:a16="http://schemas.microsoft.com/office/drawing/2014/main" xmlns="" id="{E3163627-6D5A-554C-A441-6156CE28B68A}"/>
               </a:ext>
             </a:extLst>
           </p:cNvPr>
@@ -4615,7 +5142,7 @@
           <p:cNvPr id="7" name="Picture 6">
             <a:extLst>
               <a:ext uri="{FF2B5EF4-FFF2-40B4-BE49-F238E27FC236}">
-                <a16:creationId xmlns:a16="http://schemas.microsoft.com/office/drawing/2014/main" id="{7E0D9E8F-A890-6643-9613-BB7283B924ED}"/>
+                <a16:creationId xmlns:a16="http://schemas.microsoft.com/office/drawing/2014/main" xmlns="" id="{7E0D9E8F-A890-6643-9613-BB7283B924ED}"/>
               </a:ext>
             </a:extLst>
           </p:cNvPr>
@@ -4644,7 +5171,7 @@
           <p:cNvPr id="2" name="TextBox 1">
             <a:extLst>
               <a:ext uri="{FF2B5EF4-FFF2-40B4-BE49-F238E27FC236}">
-                <a16:creationId xmlns:a16="http://schemas.microsoft.com/office/drawing/2014/main" id="{0145ED7C-6101-834A-91B4-462ACD98029A}"/>
+                <a16:creationId xmlns:a16="http://schemas.microsoft.com/office/drawing/2014/main" xmlns="" id="{0145ED7C-6101-834A-91B4-462ACD98029A}"/>
               </a:ext>
             </a:extLst>
           </p:cNvPr>
@@ -4809,7 +5336,7 @@
           <p:cNvPr id="3" name="TextBox 2">
             <a:extLst>
               <a:ext uri="{FF2B5EF4-FFF2-40B4-BE49-F238E27FC236}">
-                <a16:creationId xmlns:a16="http://schemas.microsoft.com/office/drawing/2014/main" id="{1E395313-937B-E14C-94C4-9B3A8455B93F}"/>
+                <a16:creationId xmlns:a16="http://schemas.microsoft.com/office/drawing/2014/main" xmlns="" id="{1E395313-937B-E14C-94C4-9B3A8455B93F}"/>
               </a:ext>
             </a:extLst>
           </p:cNvPr>
@@ -4819,7 +5346,7 @@
         <p:spPr>
           <a:xfrm>
             <a:off x="639191" y="2254927"/>
-            <a:ext cx="10922188" cy="1384995"/>
+            <a:ext cx="10922188" cy="2862322"/>
           </a:xfrm>
           <a:prstGeom prst="rect">
             <a:avLst/>
@@ -4858,20 +5385,1642 @@
           <a:p>
             <a:pPr algn="just"/>
             <a:r>
-              <a:rPr lang="en-US" sz="2400" dirty="0">
-                <a:solidFill>
-                  <a:srgbClr val="0A183B"/>
-                </a:solidFill>
-              </a:rPr>
-              <a:t>Lorem Ipsum...</a:t>
-            </a:r>
+              <a:rPr lang="en-US" sz="2400" dirty="0" err="1" smtClean="0">
+                <a:solidFill>
+                  <a:srgbClr val="0A183B"/>
+                </a:solidFill>
+              </a:rPr>
+              <a:t>Enseñanza</a:t>
+            </a:r>
+            <a:r>
+              <a:rPr lang="en-US" sz="2400" dirty="0" smtClean="0">
+                <a:solidFill>
+                  <a:srgbClr val="0A183B"/>
+                </a:solidFill>
+              </a:rPr>
+              <a:t> ponderosa</a:t>
+            </a:r>
+          </a:p>
+          <a:p>
+            <a:pPr algn="just"/>
+            <a:endParaRPr lang="en-US" sz="2400" dirty="0">
+              <a:solidFill>
+                <a:srgbClr val="0A183B"/>
+              </a:solidFill>
+            </a:endParaRPr>
+          </a:p>
+          <a:p>
+            <a:pPr algn="just"/>
+            <a:endParaRPr lang="en-US" sz="2400" dirty="0" smtClean="0">
+              <a:solidFill>
+                <a:srgbClr val="0A183B"/>
+              </a:solidFill>
+            </a:endParaRPr>
+          </a:p>
+          <a:p>
+            <a:pPr algn="just"/>
+            <a:r>
+              <a:rPr lang="en-US" sz="2400" dirty="0" err="1" smtClean="0">
+                <a:solidFill>
+                  <a:srgbClr val="0A183B"/>
+                </a:solidFill>
+              </a:rPr>
+              <a:t>Propuesta</a:t>
+            </a:r>
+            <a:r>
+              <a:rPr lang="en-US" sz="2400" dirty="0" smtClean="0">
+                <a:solidFill>
+                  <a:srgbClr val="0A183B"/>
+                </a:solidFill>
+              </a:rPr>
+              <a:t> de </a:t>
+            </a:r>
+            <a:r>
+              <a:rPr lang="en-US" sz="2400" dirty="0" err="1" smtClean="0">
+                <a:solidFill>
+                  <a:srgbClr val="0A183B"/>
+                </a:solidFill>
+              </a:rPr>
+              <a:t>enseñanza</a:t>
+            </a:r>
+            <a:r>
+              <a:rPr lang="en-US" sz="2400" dirty="0" smtClean="0">
+                <a:solidFill>
+                  <a:srgbClr val="0A183B"/>
+                </a:solidFill>
+              </a:rPr>
+              <a:t> </a:t>
+            </a:r>
+            <a:r>
+              <a:rPr lang="en-US" sz="2400" dirty="0" err="1" smtClean="0">
+                <a:solidFill>
+                  <a:srgbClr val="0A183B"/>
+                </a:solidFill>
+              </a:rPr>
+              <a:t>compleja</a:t>
+            </a:r>
+            <a:r>
+              <a:rPr lang="en-US" sz="2400" dirty="0" smtClean="0">
+                <a:solidFill>
+                  <a:srgbClr val="0A183B"/>
+                </a:solidFill>
+              </a:rPr>
+              <a:t>:</a:t>
+            </a:r>
+          </a:p>
+          <a:p>
+            <a:pPr marL="342900" indent="-342900" algn="just">
+              <a:buFont typeface="Arial" panose="020B0604020202020204" pitchFamily="34" charset="0"/>
+              <a:buChar char="•"/>
+            </a:pPr>
+            <a:r>
+              <a:rPr lang="en-US" sz="2400" dirty="0" err="1" smtClean="0">
+                <a:solidFill>
+                  <a:srgbClr val="0A183B"/>
+                </a:solidFill>
+              </a:rPr>
+              <a:t>Ensamble</a:t>
+            </a:r>
+            <a:endParaRPr lang="en-US" sz="2400" dirty="0">
+              <a:solidFill>
+                <a:srgbClr val="0A183B"/>
+              </a:solidFill>
+            </a:endParaRPr>
           </a:p>
         </p:txBody>
       </p:sp>
     </p:spTree>
     <p:extLst>
       <p:ext uri="{BB962C8B-B14F-4D97-AF65-F5344CB8AC3E}">
-        <p14:creationId xmlns:p14="http://schemas.microsoft.com/office/powerpoint/2010/main" val="119259899"/>
+        <p14:creationId xmlns:p14="http://schemas.microsoft.com/office/powerpoint/2010/main" val="2570885902"/>
+      </p:ext>
+    </p:extLst>
+  </p:cSld>
+  <p:clrMapOvr>
+    <a:masterClrMapping/>
+  </p:clrMapOvr>
+</p:sld>
+</file>
+
+<file path=ppt/slides/slide6.xml><?xml version="1.0" encoding="utf-8"?>
+<p:sld xmlns:a="http://schemas.openxmlformats.org/drawingml/2006/main" xmlns:r="http://schemas.openxmlformats.org/officeDocument/2006/relationships" xmlns:p="http://schemas.openxmlformats.org/presentationml/2006/main">
+  <p:cSld>
+    <p:spTree>
+      <p:nvGrpSpPr>
+        <p:cNvPr id="1" name=""/>
+        <p:cNvGrpSpPr/>
+        <p:nvPr/>
+      </p:nvGrpSpPr>
+      <p:grpSpPr>
+        <a:xfrm>
+          <a:off x="0" y="0"/>
+          <a:ext cx="0" cy="0"/>
+          <a:chOff x="0" y="0"/>
+          <a:chExt cx="0" cy="0"/>
+        </a:xfrm>
+      </p:grpSpPr>
+      <p:pic>
+        <p:nvPicPr>
+          <p:cNvPr id="5" name="Picture 4">
+            <a:extLst>
+              <a:ext uri="{FF2B5EF4-FFF2-40B4-BE49-F238E27FC236}">
+                <a16:creationId xmlns:a16="http://schemas.microsoft.com/office/drawing/2014/main" xmlns="" id="{E3163627-6D5A-554C-A441-6156CE28B68A}"/>
+              </a:ext>
+            </a:extLst>
+          </p:cNvPr>
+          <p:cNvPicPr>
+            <a:picLocks noChangeAspect="1"/>
+          </p:cNvPicPr>
+          <p:nvPr/>
+        </p:nvPicPr>
+        <p:blipFill rotWithShape="1">
+          <a:blip r:embed="rId2"/>
+          <a:srcRect l="956" t="1059" r="1448" b="1328"/>
+          <a:stretch/>
+        </p:blipFill>
+        <p:spPr>
+          <a:xfrm>
+            <a:off x="32554" y="62144"/>
+            <a:ext cx="2394767" cy="1535837"/>
+          </a:xfrm>
+          <a:prstGeom prst="rect">
+            <a:avLst/>
+          </a:prstGeom>
+        </p:spPr>
+      </p:pic>
+      <p:pic>
+        <p:nvPicPr>
+          <p:cNvPr id="7" name="Picture 6">
+            <a:extLst>
+              <a:ext uri="{FF2B5EF4-FFF2-40B4-BE49-F238E27FC236}">
+                <a16:creationId xmlns:a16="http://schemas.microsoft.com/office/drawing/2014/main" xmlns="" id="{7E0D9E8F-A890-6643-9613-BB7283B924ED}"/>
+              </a:ext>
+            </a:extLst>
+          </p:cNvPr>
+          <p:cNvPicPr>
+            <a:picLocks noChangeAspect="1"/>
+          </p:cNvPicPr>
+          <p:nvPr/>
+        </p:nvPicPr>
+        <p:blipFill rotWithShape="1">
+          <a:blip r:embed="rId3"/>
+          <a:srcRect t="21248" b="19538"/>
+          <a:stretch/>
+        </p:blipFill>
+        <p:spPr>
+          <a:xfrm>
+            <a:off x="9111448" y="0"/>
+            <a:ext cx="3047998" cy="1804844"/>
+          </a:xfrm>
+          <a:prstGeom prst="rect">
+            <a:avLst/>
+          </a:prstGeom>
+        </p:spPr>
+      </p:pic>
+      <p:sp>
+        <p:nvSpPr>
+          <p:cNvPr id="2" name="TextBox 1">
+            <a:extLst>
+              <a:ext uri="{FF2B5EF4-FFF2-40B4-BE49-F238E27FC236}">
+                <a16:creationId xmlns:a16="http://schemas.microsoft.com/office/drawing/2014/main" xmlns="" id="{0145ED7C-6101-834A-91B4-462ACD98029A}"/>
+              </a:ext>
+            </a:extLst>
+          </p:cNvPr>
+          <p:cNvSpPr txBox="1"/>
+          <p:nvPr/>
+        </p:nvSpPr>
+        <p:spPr>
+          <a:xfrm>
+            <a:off x="2427321" y="229897"/>
+            <a:ext cx="6074676" cy="1077218"/>
+          </a:xfrm>
+          <a:prstGeom prst="rect">
+            <a:avLst/>
+          </a:prstGeom>
+          <a:noFill/>
+        </p:spPr>
+        <p:txBody>
+          <a:bodyPr wrap="none" rtlCol="0">
+            <a:spAutoFit/>
+          </a:bodyPr>
+          <a:lstStyle/>
+          <a:p>
+            <a:r>
+              <a:rPr lang="en-US" sz="1600" dirty="0">
+                <a:solidFill>
+                  <a:srgbClr val="4496CF"/>
+                </a:solidFill>
+              </a:rPr>
+              <a:t>Taller: </a:t>
+            </a:r>
+          </a:p>
+          <a:p>
+            <a:r>
+              <a:rPr lang="en-US" sz="1600" b="1" dirty="0" err="1">
+                <a:solidFill>
+                  <a:srgbClr val="0A183B"/>
+                </a:solidFill>
+              </a:rPr>
+              <a:t>Programar</a:t>
+            </a:r>
+            <a:r>
+              <a:rPr lang="en-US" sz="1600" b="1" dirty="0">
+                <a:solidFill>
+                  <a:srgbClr val="0A183B"/>
+                </a:solidFill>
+              </a:rPr>
+              <a:t> y </a:t>
+            </a:r>
+            <a:r>
+              <a:rPr lang="en-US" sz="1600" b="1" dirty="0" err="1">
+                <a:solidFill>
+                  <a:srgbClr val="0A183B"/>
+                </a:solidFill>
+              </a:rPr>
+              <a:t>Reprogramar</a:t>
+            </a:r>
+            <a:r>
+              <a:rPr lang="en-US" sz="1600" b="1" dirty="0">
+                <a:solidFill>
+                  <a:srgbClr val="0A183B"/>
+                </a:solidFill>
+              </a:rPr>
+              <a:t> </a:t>
+            </a:r>
+            <a:r>
+              <a:rPr lang="en-US" sz="1600" b="1" dirty="0" err="1">
+                <a:solidFill>
+                  <a:srgbClr val="0A183B"/>
+                </a:solidFill>
+              </a:rPr>
+              <a:t>Recursos</a:t>
+            </a:r>
+            <a:r>
+              <a:rPr lang="en-US" sz="1600" b="1" dirty="0">
+                <a:solidFill>
+                  <a:srgbClr val="0A183B"/>
+                </a:solidFill>
+              </a:rPr>
+              <a:t> para </a:t>
+            </a:r>
+            <a:r>
+              <a:rPr lang="en-US" sz="1600" b="1" dirty="0" err="1">
+                <a:solidFill>
+                  <a:srgbClr val="0A183B"/>
+                </a:solidFill>
+              </a:rPr>
+              <a:t>Docentes</a:t>
+            </a:r>
+            <a:r>
+              <a:rPr lang="en-US" sz="1600" b="1" dirty="0">
+                <a:solidFill>
+                  <a:srgbClr val="0A183B"/>
+                </a:solidFill>
+              </a:rPr>
+              <a:t> (Python + </a:t>
+            </a:r>
+            <a:r>
+              <a:rPr lang="en-US" sz="1600" b="1" dirty="0" err="1">
+                <a:solidFill>
+                  <a:srgbClr val="0A183B"/>
+                </a:solidFill>
+              </a:rPr>
+              <a:t>Jupyter</a:t>
+            </a:r>
+            <a:r>
+              <a:rPr lang="en-US" sz="1600" b="1" dirty="0">
+                <a:solidFill>
+                  <a:srgbClr val="0A183B"/>
+                </a:solidFill>
+              </a:rPr>
+              <a:t>)</a:t>
+            </a:r>
+          </a:p>
+          <a:p>
+            <a:r>
+              <a:rPr lang="en-US" sz="1600" dirty="0">
+                <a:solidFill>
+                  <a:srgbClr val="4496CF"/>
+                </a:solidFill>
+              </a:rPr>
+              <a:t>Sofía Martin, Ariel Ramos, Liliana Hurtado, Sebastián Flores</a:t>
+            </a:r>
+          </a:p>
+          <a:p>
+            <a:r>
+              <a:rPr lang="en-US" sz="1600" dirty="0" err="1">
+                <a:solidFill>
+                  <a:srgbClr val="4496CF"/>
+                </a:solidFill>
+              </a:rPr>
+              <a:t>PyCon</a:t>
+            </a:r>
+            <a:r>
+              <a:rPr lang="en-US" sz="1600" dirty="0">
+                <a:solidFill>
+                  <a:srgbClr val="4496CF"/>
+                </a:solidFill>
+              </a:rPr>
+              <a:t> Argentina, 29 </a:t>
+            </a:r>
+            <a:r>
+              <a:rPr lang="en-US" sz="1600" dirty="0" err="1">
+                <a:solidFill>
+                  <a:srgbClr val="4496CF"/>
+                </a:solidFill>
+              </a:rPr>
+              <a:t>Noviembre</a:t>
+            </a:r>
+            <a:r>
+              <a:rPr lang="en-US" sz="1600" dirty="0">
+                <a:solidFill>
+                  <a:srgbClr val="4496CF"/>
+                </a:solidFill>
+              </a:rPr>
+              <a:t> 2021</a:t>
+            </a:r>
+          </a:p>
+        </p:txBody>
+      </p:sp>
+      <p:sp>
+        <p:nvSpPr>
+          <p:cNvPr id="3" name="TextBox 2">
+            <a:extLst>
+              <a:ext uri="{FF2B5EF4-FFF2-40B4-BE49-F238E27FC236}">
+                <a16:creationId xmlns:a16="http://schemas.microsoft.com/office/drawing/2014/main" xmlns="" id="{1E395313-937B-E14C-94C4-9B3A8455B93F}"/>
+              </a:ext>
+            </a:extLst>
+          </p:cNvPr>
+          <p:cNvSpPr txBox="1"/>
+          <p:nvPr/>
+        </p:nvSpPr>
+        <p:spPr>
+          <a:xfrm>
+            <a:off x="639191" y="3060145"/>
+            <a:ext cx="10922188" cy="3231654"/>
+          </a:xfrm>
+          <a:prstGeom prst="rect">
+            <a:avLst/>
+          </a:prstGeom>
+          <a:noFill/>
+        </p:spPr>
+        <p:txBody>
+          <a:bodyPr wrap="square" rtlCol="0">
+            <a:spAutoFit/>
+          </a:bodyPr>
+          <a:lstStyle/>
+          <a:p>
+            <a:pPr algn="just"/>
+            <a:r>
+              <a:rPr lang="en-US" sz="3600" dirty="0" err="1">
+                <a:solidFill>
+                  <a:srgbClr val="4496CF"/>
+                </a:solidFill>
+              </a:rPr>
+              <a:t>Motivación</a:t>
+            </a:r>
+            <a:endParaRPr lang="en-US" sz="3600" dirty="0">
+              <a:solidFill>
+                <a:srgbClr val="4496CF"/>
+              </a:solidFill>
+            </a:endParaRPr>
+          </a:p>
+          <a:p>
+            <a:pPr algn="just"/>
+            <a:r>
+              <a:rPr lang="en-US" sz="2400" dirty="0" err="1" smtClean="0">
+                <a:solidFill>
+                  <a:srgbClr val="0A183B"/>
+                </a:solidFill>
+              </a:rPr>
+              <a:t>Evaluación</a:t>
+            </a:r>
+            <a:r>
+              <a:rPr lang="en-US" sz="2400" dirty="0" smtClean="0">
+                <a:solidFill>
+                  <a:srgbClr val="0A183B"/>
+                </a:solidFill>
+              </a:rPr>
+              <a:t>:</a:t>
+            </a:r>
+          </a:p>
+          <a:p>
+            <a:pPr marL="342900" indent="-342900" algn="just">
+              <a:buFont typeface="Arial" panose="020B0604020202020204" pitchFamily="34" charset="0"/>
+              <a:buChar char="•"/>
+            </a:pPr>
+            <a:r>
+              <a:rPr lang="en-US" sz="2400" dirty="0" err="1" smtClean="0">
+                <a:solidFill>
+                  <a:srgbClr val="0A183B"/>
+                </a:solidFill>
+              </a:rPr>
+              <a:t>Retroalimentación</a:t>
+            </a:r>
+            <a:r>
+              <a:rPr lang="en-US" sz="2400" dirty="0" smtClean="0">
+                <a:solidFill>
+                  <a:srgbClr val="0A183B"/>
+                </a:solidFill>
+              </a:rPr>
+              <a:t> </a:t>
+            </a:r>
+            <a:r>
+              <a:rPr lang="en-US" sz="2400" dirty="0" err="1" smtClean="0">
+                <a:solidFill>
+                  <a:srgbClr val="0A183B"/>
+                </a:solidFill>
+              </a:rPr>
+              <a:t>formativa</a:t>
+            </a:r>
+            <a:endParaRPr lang="en-US" sz="2400" dirty="0" smtClean="0">
+              <a:solidFill>
+                <a:srgbClr val="0A183B"/>
+              </a:solidFill>
+            </a:endParaRPr>
+          </a:p>
+          <a:p>
+            <a:pPr marL="800100" lvl="1" indent="-342900" algn="just">
+              <a:buFont typeface="Arial" panose="020B0604020202020204" pitchFamily="34" charset="0"/>
+              <a:buChar char="•"/>
+            </a:pPr>
+            <a:r>
+              <a:rPr lang="en-US" sz="2400" dirty="0" err="1" smtClean="0">
+                <a:solidFill>
+                  <a:srgbClr val="0A183B"/>
+                </a:solidFill>
+              </a:rPr>
+              <a:t>Cuaderno</a:t>
+            </a:r>
+            <a:r>
+              <a:rPr lang="en-US" sz="2400" dirty="0" smtClean="0">
+                <a:solidFill>
+                  <a:srgbClr val="0A183B"/>
+                </a:solidFill>
+              </a:rPr>
+              <a:t> (</a:t>
+            </a:r>
+            <a:r>
+              <a:rPr lang="en-US" sz="2400" dirty="0" err="1" smtClean="0">
+                <a:solidFill>
+                  <a:srgbClr val="0A183B"/>
+                </a:solidFill>
+              </a:rPr>
+              <a:t>Texto</a:t>
+            </a:r>
+            <a:r>
+              <a:rPr lang="en-US" sz="2400" dirty="0" smtClean="0">
+                <a:solidFill>
+                  <a:srgbClr val="0A183B"/>
+                </a:solidFill>
+              </a:rPr>
+              <a:t>-</a:t>
+            </a:r>
+            <a:r>
+              <a:rPr lang="en-US" sz="2400" dirty="0" err="1" smtClean="0">
+                <a:solidFill>
+                  <a:srgbClr val="0A183B"/>
+                </a:solidFill>
+              </a:rPr>
+              <a:t>Código</a:t>
+            </a:r>
+            <a:r>
+              <a:rPr lang="en-US" sz="2400" dirty="0" smtClean="0">
+                <a:solidFill>
+                  <a:srgbClr val="0A183B"/>
+                </a:solidFill>
+              </a:rPr>
+              <a:t>-</a:t>
+            </a:r>
+            <a:r>
+              <a:rPr lang="en-US" sz="2400" dirty="0" err="1" smtClean="0">
+                <a:solidFill>
+                  <a:srgbClr val="0A183B"/>
+                </a:solidFill>
+              </a:rPr>
+              <a:t>Gráfico</a:t>
+            </a:r>
+            <a:r>
+              <a:rPr lang="en-US" sz="2400" dirty="0" smtClean="0">
+                <a:solidFill>
+                  <a:srgbClr val="0A183B"/>
+                </a:solidFill>
+              </a:rPr>
+              <a:t>-Imagen): </a:t>
+            </a:r>
+            <a:r>
+              <a:rPr lang="en-US" sz="2400" dirty="0" err="1" smtClean="0">
+                <a:solidFill>
+                  <a:srgbClr val="0A183B"/>
+                </a:solidFill>
+              </a:rPr>
+              <a:t>Evaluación</a:t>
+            </a:r>
+            <a:r>
+              <a:rPr lang="en-US" sz="2400" dirty="0" smtClean="0">
+                <a:solidFill>
+                  <a:srgbClr val="0A183B"/>
+                </a:solidFill>
+              </a:rPr>
+              <a:t>- </a:t>
+            </a:r>
+            <a:r>
+              <a:rPr lang="en-US" sz="2400" dirty="0" err="1" smtClean="0">
+                <a:solidFill>
+                  <a:srgbClr val="0A183B"/>
+                </a:solidFill>
+              </a:rPr>
+              <a:t>autoevaluación</a:t>
+            </a:r>
+            <a:endParaRPr lang="en-US" sz="2400" dirty="0">
+              <a:solidFill>
+                <a:srgbClr val="0A183B"/>
+              </a:solidFill>
+            </a:endParaRPr>
+          </a:p>
+          <a:p>
+            <a:pPr marL="342900" indent="-342900" algn="just">
+              <a:buFont typeface="Arial" panose="020B0604020202020204" pitchFamily="34" charset="0"/>
+              <a:buChar char="•"/>
+            </a:pPr>
+            <a:r>
+              <a:rPr lang="en-US" sz="2400" dirty="0" err="1" smtClean="0">
+                <a:solidFill>
+                  <a:srgbClr val="0A183B"/>
+                </a:solidFill>
+              </a:rPr>
+              <a:t>Grilla</a:t>
+            </a:r>
+            <a:r>
+              <a:rPr lang="en-US" sz="2400" dirty="0" smtClean="0">
+                <a:solidFill>
+                  <a:srgbClr val="0A183B"/>
+                </a:solidFill>
+              </a:rPr>
+              <a:t>: </a:t>
+            </a:r>
+            <a:r>
+              <a:rPr lang="en-US" sz="2400" dirty="0" err="1" smtClean="0">
+                <a:solidFill>
+                  <a:srgbClr val="0A183B"/>
+                </a:solidFill>
+              </a:rPr>
+              <a:t>Criterios</a:t>
+            </a:r>
+            <a:r>
+              <a:rPr lang="en-US" sz="2400" dirty="0" smtClean="0">
+                <a:solidFill>
+                  <a:srgbClr val="0A183B"/>
+                </a:solidFill>
+              </a:rPr>
+              <a:t>- </a:t>
+            </a:r>
+            <a:r>
+              <a:rPr lang="en-US" sz="2400" dirty="0" err="1" smtClean="0">
+                <a:solidFill>
+                  <a:srgbClr val="0A183B"/>
+                </a:solidFill>
+              </a:rPr>
+              <a:t>Niveles</a:t>
+            </a:r>
+            <a:r>
+              <a:rPr lang="en-US" sz="2400" dirty="0" smtClean="0">
+                <a:solidFill>
+                  <a:srgbClr val="0A183B"/>
+                </a:solidFill>
+              </a:rPr>
+              <a:t>: (</a:t>
+            </a:r>
+            <a:r>
+              <a:rPr lang="en-US" sz="2400" dirty="0" err="1" smtClean="0">
+                <a:solidFill>
+                  <a:srgbClr val="0A183B"/>
+                </a:solidFill>
+              </a:rPr>
+              <a:t>Descriptores</a:t>
+            </a:r>
+            <a:r>
+              <a:rPr lang="en-US" sz="2400" dirty="0" smtClean="0">
+                <a:solidFill>
+                  <a:srgbClr val="0A183B"/>
+                </a:solidFill>
+              </a:rPr>
+              <a:t>)</a:t>
+            </a:r>
+          </a:p>
+          <a:p>
+            <a:pPr marL="342900" indent="-342900" algn="just">
+              <a:buFont typeface="Arial" panose="020B0604020202020204" pitchFamily="34" charset="0"/>
+              <a:buChar char="•"/>
+            </a:pPr>
+            <a:r>
+              <a:rPr lang="en-US" sz="2400" dirty="0" err="1" smtClean="0">
+                <a:solidFill>
+                  <a:srgbClr val="0A183B"/>
+                </a:solidFill>
+              </a:rPr>
+              <a:t>Herramientas</a:t>
+            </a:r>
+            <a:r>
+              <a:rPr lang="en-US" sz="2400" dirty="0" smtClean="0">
+                <a:solidFill>
+                  <a:srgbClr val="0A183B"/>
+                </a:solidFill>
+              </a:rPr>
+              <a:t>: </a:t>
+            </a:r>
+            <a:r>
+              <a:rPr lang="en-US" sz="2400" dirty="0" err="1" smtClean="0">
+                <a:solidFill>
+                  <a:srgbClr val="0A183B"/>
+                </a:solidFill>
+              </a:rPr>
+              <a:t>Lenguaje</a:t>
+            </a:r>
+            <a:r>
+              <a:rPr lang="en-US" sz="2400" dirty="0" smtClean="0">
+                <a:solidFill>
+                  <a:srgbClr val="0A183B"/>
+                </a:solidFill>
+              </a:rPr>
+              <a:t> de </a:t>
+            </a:r>
+            <a:r>
+              <a:rPr lang="en-US" sz="2400" dirty="0" err="1" smtClean="0">
+                <a:solidFill>
+                  <a:srgbClr val="0A183B"/>
+                </a:solidFill>
+              </a:rPr>
+              <a:t>programación</a:t>
+            </a:r>
+            <a:r>
+              <a:rPr lang="en-US" sz="2400" dirty="0" smtClean="0">
+                <a:solidFill>
+                  <a:srgbClr val="0A183B"/>
+                </a:solidFill>
+              </a:rPr>
+              <a:t> (Python) + </a:t>
+            </a:r>
+            <a:r>
+              <a:rPr lang="en-US" sz="2400" dirty="0" err="1" smtClean="0">
+                <a:solidFill>
+                  <a:srgbClr val="0A183B"/>
+                </a:solidFill>
+              </a:rPr>
+              <a:t>Entorno</a:t>
+            </a:r>
+            <a:r>
+              <a:rPr lang="en-US" sz="2400" dirty="0" smtClean="0">
+                <a:solidFill>
+                  <a:srgbClr val="0A183B"/>
+                </a:solidFill>
+              </a:rPr>
+              <a:t> de </a:t>
+            </a:r>
+            <a:r>
+              <a:rPr lang="en-US" sz="2400" dirty="0" err="1" smtClean="0">
+                <a:solidFill>
+                  <a:srgbClr val="0A183B"/>
+                </a:solidFill>
+              </a:rPr>
+              <a:t>Trabajo</a:t>
+            </a:r>
+            <a:r>
+              <a:rPr lang="en-US" sz="2400" dirty="0" smtClean="0">
+                <a:solidFill>
+                  <a:srgbClr val="0A183B"/>
+                </a:solidFill>
+              </a:rPr>
+              <a:t> (</a:t>
+            </a:r>
+            <a:r>
+              <a:rPr lang="en-US" sz="2400" dirty="0" err="1" smtClean="0">
+                <a:solidFill>
+                  <a:srgbClr val="0A183B"/>
+                </a:solidFill>
+              </a:rPr>
+              <a:t>Jupyter</a:t>
+            </a:r>
+            <a:r>
+              <a:rPr lang="en-US" sz="2400" dirty="0" smtClean="0">
+                <a:solidFill>
+                  <a:srgbClr val="0A183B"/>
+                </a:solidFill>
+              </a:rPr>
+              <a:t>)+ </a:t>
+            </a:r>
+            <a:r>
+              <a:rPr lang="en-US" sz="2400" dirty="0" err="1" smtClean="0">
+                <a:solidFill>
+                  <a:srgbClr val="0A183B"/>
+                </a:solidFill>
+              </a:rPr>
+              <a:t>Infrastructura</a:t>
+            </a:r>
+            <a:r>
+              <a:rPr lang="en-US" sz="2400" dirty="0" smtClean="0">
+                <a:solidFill>
+                  <a:srgbClr val="0A183B"/>
+                </a:solidFill>
+              </a:rPr>
+              <a:t>  (VPS)</a:t>
+            </a:r>
+            <a:endParaRPr lang="en-US" sz="2400" dirty="0">
+              <a:solidFill>
+                <a:srgbClr val="0A183B"/>
+              </a:solidFill>
+            </a:endParaRPr>
+          </a:p>
+          <a:p>
+            <a:pPr marL="342900" indent="-342900" algn="just">
+              <a:buFont typeface="Arial" panose="020B0604020202020204" pitchFamily="34" charset="0"/>
+              <a:buChar char="•"/>
+            </a:pPr>
+            <a:r>
+              <a:rPr lang="en-US" sz="2400" dirty="0" err="1" smtClean="0">
+                <a:solidFill>
+                  <a:srgbClr val="0A183B"/>
+                </a:solidFill>
+              </a:rPr>
+              <a:t>Contenidos</a:t>
+            </a:r>
+            <a:r>
+              <a:rPr lang="en-US" sz="2400" dirty="0" smtClean="0">
+                <a:solidFill>
+                  <a:srgbClr val="0A183B"/>
+                </a:solidFill>
+              </a:rPr>
+              <a:t> a </a:t>
+            </a:r>
+            <a:r>
+              <a:rPr lang="en-US" sz="2400" dirty="0" err="1" smtClean="0">
+                <a:solidFill>
+                  <a:srgbClr val="0A183B"/>
+                </a:solidFill>
+              </a:rPr>
+              <a:t>Enseñar</a:t>
+            </a:r>
+            <a:endParaRPr lang="en-US" sz="2400" dirty="0" smtClean="0">
+              <a:solidFill>
+                <a:srgbClr val="0A183B"/>
+              </a:solidFill>
+            </a:endParaRPr>
+          </a:p>
+        </p:txBody>
+      </p:sp>
+    </p:spTree>
+    <p:extLst>
+      <p:ext uri="{BB962C8B-B14F-4D97-AF65-F5344CB8AC3E}">
+        <p14:creationId xmlns:p14="http://schemas.microsoft.com/office/powerpoint/2010/main" val="3030815271"/>
+      </p:ext>
+    </p:extLst>
+  </p:cSld>
+  <p:clrMapOvr>
+    <a:masterClrMapping/>
+  </p:clrMapOvr>
+</p:sld>
+</file>
+
+<file path=ppt/slides/slide7.xml><?xml version="1.0" encoding="utf-8"?>
+<p:sld xmlns:a="http://schemas.openxmlformats.org/drawingml/2006/main" xmlns:r="http://schemas.openxmlformats.org/officeDocument/2006/relationships" xmlns:p="http://schemas.openxmlformats.org/presentationml/2006/main">
+  <p:cSld>
+    <p:spTree>
+      <p:nvGrpSpPr>
+        <p:cNvPr id="1" name=""/>
+        <p:cNvGrpSpPr/>
+        <p:nvPr/>
+      </p:nvGrpSpPr>
+      <p:grpSpPr>
+        <a:xfrm>
+          <a:off x="0" y="0"/>
+          <a:ext cx="0" cy="0"/>
+          <a:chOff x="0" y="0"/>
+          <a:chExt cx="0" cy="0"/>
+        </a:xfrm>
+      </p:grpSpPr>
+      <p:pic>
+        <p:nvPicPr>
+          <p:cNvPr id="5" name="Picture 4">
+            <a:extLst>
+              <a:ext uri="{FF2B5EF4-FFF2-40B4-BE49-F238E27FC236}">
+                <a16:creationId xmlns:a16="http://schemas.microsoft.com/office/drawing/2014/main" xmlns="" id="{E3163627-6D5A-554C-A441-6156CE28B68A}"/>
+              </a:ext>
+            </a:extLst>
+          </p:cNvPr>
+          <p:cNvPicPr>
+            <a:picLocks noChangeAspect="1"/>
+          </p:cNvPicPr>
+          <p:nvPr/>
+        </p:nvPicPr>
+        <p:blipFill rotWithShape="1">
+          <a:blip r:embed="rId2"/>
+          <a:srcRect l="956" t="1059" r="1448" b="1328"/>
+          <a:stretch/>
+        </p:blipFill>
+        <p:spPr>
+          <a:xfrm>
+            <a:off x="32554" y="7553"/>
+            <a:ext cx="2394767" cy="1535837"/>
+          </a:xfrm>
+          <a:prstGeom prst="rect">
+            <a:avLst/>
+          </a:prstGeom>
+        </p:spPr>
+      </p:pic>
+      <p:pic>
+        <p:nvPicPr>
+          <p:cNvPr id="7" name="Picture 6">
+            <a:extLst>
+              <a:ext uri="{FF2B5EF4-FFF2-40B4-BE49-F238E27FC236}">
+                <a16:creationId xmlns:a16="http://schemas.microsoft.com/office/drawing/2014/main" xmlns="" id="{7E0D9E8F-A890-6643-9613-BB7283B924ED}"/>
+              </a:ext>
+            </a:extLst>
+          </p:cNvPr>
+          <p:cNvPicPr>
+            <a:picLocks noChangeAspect="1"/>
+          </p:cNvPicPr>
+          <p:nvPr/>
+        </p:nvPicPr>
+        <p:blipFill rotWithShape="1">
+          <a:blip r:embed="rId3"/>
+          <a:srcRect t="21248" b="19538"/>
+          <a:stretch/>
+        </p:blipFill>
+        <p:spPr>
+          <a:xfrm>
+            <a:off x="9111448" y="0"/>
+            <a:ext cx="3047998" cy="1804844"/>
+          </a:xfrm>
+          <a:prstGeom prst="rect">
+            <a:avLst/>
+          </a:prstGeom>
+        </p:spPr>
+      </p:pic>
+      <p:sp>
+        <p:nvSpPr>
+          <p:cNvPr id="2" name="TextBox 1">
+            <a:extLst>
+              <a:ext uri="{FF2B5EF4-FFF2-40B4-BE49-F238E27FC236}">
+                <a16:creationId xmlns:a16="http://schemas.microsoft.com/office/drawing/2014/main" xmlns="" id="{0145ED7C-6101-834A-91B4-462ACD98029A}"/>
+              </a:ext>
+            </a:extLst>
+          </p:cNvPr>
+          <p:cNvSpPr txBox="1"/>
+          <p:nvPr/>
+        </p:nvSpPr>
+        <p:spPr>
+          <a:xfrm>
+            <a:off x="2427321" y="229897"/>
+            <a:ext cx="6074676" cy="1077218"/>
+          </a:xfrm>
+          <a:prstGeom prst="rect">
+            <a:avLst/>
+          </a:prstGeom>
+          <a:noFill/>
+        </p:spPr>
+        <p:txBody>
+          <a:bodyPr wrap="none" rtlCol="0">
+            <a:spAutoFit/>
+          </a:bodyPr>
+          <a:lstStyle/>
+          <a:p>
+            <a:r>
+              <a:rPr lang="en-US" sz="1600" dirty="0">
+                <a:solidFill>
+                  <a:srgbClr val="4496CF"/>
+                </a:solidFill>
+              </a:rPr>
+              <a:t>Taller: </a:t>
+            </a:r>
+          </a:p>
+          <a:p>
+            <a:r>
+              <a:rPr lang="en-US" sz="1600" b="1" dirty="0" err="1">
+                <a:solidFill>
+                  <a:srgbClr val="0A183B"/>
+                </a:solidFill>
+              </a:rPr>
+              <a:t>Programar</a:t>
+            </a:r>
+            <a:r>
+              <a:rPr lang="en-US" sz="1600" b="1" dirty="0">
+                <a:solidFill>
+                  <a:srgbClr val="0A183B"/>
+                </a:solidFill>
+              </a:rPr>
+              <a:t> y </a:t>
+            </a:r>
+            <a:r>
+              <a:rPr lang="en-US" sz="1600" b="1" dirty="0" err="1">
+                <a:solidFill>
+                  <a:srgbClr val="0A183B"/>
+                </a:solidFill>
+              </a:rPr>
+              <a:t>Reprogramar</a:t>
+            </a:r>
+            <a:r>
+              <a:rPr lang="en-US" sz="1600" b="1" dirty="0">
+                <a:solidFill>
+                  <a:srgbClr val="0A183B"/>
+                </a:solidFill>
+              </a:rPr>
+              <a:t> </a:t>
+            </a:r>
+            <a:r>
+              <a:rPr lang="en-US" sz="1600" b="1" dirty="0" err="1">
+                <a:solidFill>
+                  <a:srgbClr val="0A183B"/>
+                </a:solidFill>
+              </a:rPr>
+              <a:t>Recursos</a:t>
+            </a:r>
+            <a:r>
+              <a:rPr lang="en-US" sz="1600" b="1" dirty="0">
+                <a:solidFill>
+                  <a:srgbClr val="0A183B"/>
+                </a:solidFill>
+              </a:rPr>
+              <a:t> para </a:t>
+            </a:r>
+            <a:r>
+              <a:rPr lang="en-US" sz="1600" b="1" dirty="0" err="1">
+                <a:solidFill>
+                  <a:srgbClr val="0A183B"/>
+                </a:solidFill>
+              </a:rPr>
+              <a:t>Docentes</a:t>
+            </a:r>
+            <a:r>
+              <a:rPr lang="en-US" sz="1600" b="1" dirty="0">
+                <a:solidFill>
+                  <a:srgbClr val="0A183B"/>
+                </a:solidFill>
+              </a:rPr>
+              <a:t> (Python + </a:t>
+            </a:r>
+            <a:r>
+              <a:rPr lang="en-US" sz="1600" b="1" dirty="0" err="1">
+                <a:solidFill>
+                  <a:srgbClr val="0A183B"/>
+                </a:solidFill>
+              </a:rPr>
+              <a:t>Jupyter</a:t>
+            </a:r>
+            <a:r>
+              <a:rPr lang="en-US" sz="1600" b="1" dirty="0">
+                <a:solidFill>
+                  <a:srgbClr val="0A183B"/>
+                </a:solidFill>
+              </a:rPr>
+              <a:t>)</a:t>
+            </a:r>
+          </a:p>
+          <a:p>
+            <a:r>
+              <a:rPr lang="en-US" sz="1600" dirty="0">
+                <a:solidFill>
+                  <a:srgbClr val="4496CF"/>
+                </a:solidFill>
+              </a:rPr>
+              <a:t>Sofía Martin, Ariel Ramos, Liliana Hurtado, Sebastián Flores</a:t>
+            </a:r>
+          </a:p>
+          <a:p>
+            <a:r>
+              <a:rPr lang="en-US" sz="1600" dirty="0" err="1">
+                <a:solidFill>
+                  <a:srgbClr val="4496CF"/>
+                </a:solidFill>
+              </a:rPr>
+              <a:t>PyCon</a:t>
+            </a:r>
+            <a:r>
+              <a:rPr lang="en-US" sz="1600" dirty="0">
+                <a:solidFill>
+                  <a:srgbClr val="4496CF"/>
+                </a:solidFill>
+              </a:rPr>
+              <a:t> Argentina, 29 </a:t>
+            </a:r>
+            <a:r>
+              <a:rPr lang="en-US" sz="1600" dirty="0" err="1">
+                <a:solidFill>
+                  <a:srgbClr val="4496CF"/>
+                </a:solidFill>
+              </a:rPr>
+              <a:t>Noviembre</a:t>
+            </a:r>
+            <a:r>
+              <a:rPr lang="en-US" sz="1600" dirty="0">
+                <a:solidFill>
+                  <a:srgbClr val="4496CF"/>
+                </a:solidFill>
+              </a:rPr>
+              <a:t> 2021</a:t>
+            </a:r>
+          </a:p>
+        </p:txBody>
+      </p:sp>
+      <p:pic>
+        <p:nvPicPr>
+          <p:cNvPr id="4" name="Imagen 3"/>
+          <p:cNvPicPr>
+            <a:picLocks noChangeAspect="1"/>
+          </p:cNvPicPr>
+          <p:nvPr/>
+        </p:nvPicPr>
+        <p:blipFill>
+          <a:blip r:embed="rId4">
+            <a:extLst>
+              <a:ext uri="{28A0092B-C50C-407E-A947-70E740481C1C}">
+                <a14:useLocalDpi xmlns:a14="http://schemas.microsoft.com/office/drawing/2010/main" val="0"/>
+              </a:ext>
+            </a:extLst>
+          </a:blip>
+          <a:stretch>
+            <a:fillRect/>
+          </a:stretch>
+        </p:blipFill>
+        <p:spPr>
+          <a:xfrm>
+            <a:off x="3601942" y="2027187"/>
+            <a:ext cx="7916279" cy="4449431"/>
+          </a:xfrm>
+          <a:prstGeom prst="rect">
+            <a:avLst/>
+          </a:prstGeom>
+        </p:spPr>
+      </p:pic>
+    </p:spTree>
+    <p:extLst>
+      <p:ext uri="{BB962C8B-B14F-4D97-AF65-F5344CB8AC3E}">
+        <p14:creationId xmlns:p14="http://schemas.microsoft.com/office/powerpoint/2010/main" val="3177041939"/>
+      </p:ext>
+    </p:extLst>
+  </p:cSld>
+  <p:clrMapOvr>
+    <a:masterClrMapping/>
+  </p:clrMapOvr>
+</p:sld>
+</file>
+
+<file path=ppt/slides/slide8.xml><?xml version="1.0" encoding="utf-8"?>
+<p:sld xmlns:a="http://schemas.openxmlformats.org/drawingml/2006/main" xmlns:r="http://schemas.openxmlformats.org/officeDocument/2006/relationships" xmlns:p="http://schemas.openxmlformats.org/presentationml/2006/main">
+  <p:cSld>
+    <p:spTree>
+      <p:nvGrpSpPr>
+        <p:cNvPr id="1" name=""/>
+        <p:cNvGrpSpPr/>
+        <p:nvPr/>
+      </p:nvGrpSpPr>
+      <p:grpSpPr>
+        <a:xfrm>
+          <a:off x="0" y="0"/>
+          <a:ext cx="0" cy="0"/>
+          <a:chOff x="0" y="0"/>
+          <a:chExt cx="0" cy="0"/>
+        </a:xfrm>
+      </p:grpSpPr>
+      <p:pic>
+        <p:nvPicPr>
+          <p:cNvPr id="5" name="Picture 4">
+            <a:extLst>
+              <a:ext uri="{FF2B5EF4-FFF2-40B4-BE49-F238E27FC236}">
+                <a16:creationId xmlns:a16="http://schemas.microsoft.com/office/drawing/2014/main" xmlns="" id="{E3163627-6D5A-554C-A441-6156CE28B68A}"/>
+              </a:ext>
+            </a:extLst>
+          </p:cNvPr>
+          <p:cNvPicPr>
+            <a:picLocks noChangeAspect="1"/>
+          </p:cNvPicPr>
+          <p:nvPr/>
+        </p:nvPicPr>
+        <p:blipFill rotWithShape="1">
+          <a:blip r:embed="rId2"/>
+          <a:srcRect l="956" t="1059" r="1448" b="1328"/>
+          <a:stretch/>
+        </p:blipFill>
+        <p:spPr>
+          <a:xfrm>
+            <a:off x="32554" y="62144"/>
+            <a:ext cx="2394767" cy="1535837"/>
+          </a:xfrm>
+          <a:prstGeom prst="rect">
+            <a:avLst/>
+          </a:prstGeom>
+        </p:spPr>
+      </p:pic>
+      <p:pic>
+        <p:nvPicPr>
+          <p:cNvPr id="7" name="Picture 6">
+            <a:extLst>
+              <a:ext uri="{FF2B5EF4-FFF2-40B4-BE49-F238E27FC236}">
+                <a16:creationId xmlns:a16="http://schemas.microsoft.com/office/drawing/2014/main" xmlns="" id="{7E0D9E8F-A890-6643-9613-BB7283B924ED}"/>
+              </a:ext>
+            </a:extLst>
+          </p:cNvPr>
+          <p:cNvPicPr>
+            <a:picLocks noChangeAspect="1"/>
+          </p:cNvPicPr>
+          <p:nvPr/>
+        </p:nvPicPr>
+        <p:blipFill rotWithShape="1">
+          <a:blip r:embed="rId3"/>
+          <a:srcRect t="21248" b="19538"/>
+          <a:stretch/>
+        </p:blipFill>
+        <p:spPr>
+          <a:xfrm>
+            <a:off x="9111448" y="0"/>
+            <a:ext cx="3047998" cy="1804844"/>
+          </a:xfrm>
+          <a:prstGeom prst="rect">
+            <a:avLst/>
+          </a:prstGeom>
+        </p:spPr>
+      </p:pic>
+      <p:sp>
+        <p:nvSpPr>
+          <p:cNvPr id="2" name="TextBox 1">
+            <a:extLst>
+              <a:ext uri="{FF2B5EF4-FFF2-40B4-BE49-F238E27FC236}">
+                <a16:creationId xmlns:a16="http://schemas.microsoft.com/office/drawing/2014/main" xmlns="" id="{0145ED7C-6101-834A-91B4-462ACD98029A}"/>
+              </a:ext>
+            </a:extLst>
+          </p:cNvPr>
+          <p:cNvSpPr txBox="1"/>
+          <p:nvPr/>
+        </p:nvSpPr>
+        <p:spPr>
+          <a:xfrm>
+            <a:off x="2427321" y="229897"/>
+            <a:ext cx="6074676" cy="1077218"/>
+          </a:xfrm>
+          <a:prstGeom prst="rect">
+            <a:avLst/>
+          </a:prstGeom>
+          <a:noFill/>
+        </p:spPr>
+        <p:txBody>
+          <a:bodyPr wrap="none" rtlCol="0">
+            <a:spAutoFit/>
+          </a:bodyPr>
+          <a:lstStyle/>
+          <a:p>
+            <a:r>
+              <a:rPr lang="en-US" sz="1600" dirty="0">
+                <a:solidFill>
+                  <a:srgbClr val="4496CF"/>
+                </a:solidFill>
+              </a:rPr>
+              <a:t>Taller: </a:t>
+            </a:r>
+          </a:p>
+          <a:p>
+            <a:r>
+              <a:rPr lang="en-US" sz="1600" b="1" dirty="0" err="1">
+                <a:solidFill>
+                  <a:srgbClr val="0A183B"/>
+                </a:solidFill>
+              </a:rPr>
+              <a:t>Programar</a:t>
+            </a:r>
+            <a:r>
+              <a:rPr lang="en-US" sz="1600" b="1" dirty="0">
+                <a:solidFill>
+                  <a:srgbClr val="0A183B"/>
+                </a:solidFill>
+              </a:rPr>
+              <a:t> y </a:t>
+            </a:r>
+            <a:r>
+              <a:rPr lang="en-US" sz="1600" b="1" dirty="0" err="1">
+                <a:solidFill>
+                  <a:srgbClr val="0A183B"/>
+                </a:solidFill>
+              </a:rPr>
+              <a:t>Reprogramar</a:t>
+            </a:r>
+            <a:r>
+              <a:rPr lang="en-US" sz="1600" b="1" dirty="0">
+                <a:solidFill>
+                  <a:srgbClr val="0A183B"/>
+                </a:solidFill>
+              </a:rPr>
+              <a:t> </a:t>
+            </a:r>
+            <a:r>
+              <a:rPr lang="en-US" sz="1600" b="1" dirty="0" err="1">
+                <a:solidFill>
+                  <a:srgbClr val="0A183B"/>
+                </a:solidFill>
+              </a:rPr>
+              <a:t>Recursos</a:t>
+            </a:r>
+            <a:r>
+              <a:rPr lang="en-US" sz="1600" b="1" dirty="0">
+                <a:solidFill>
+                  <a:srgbClr val="0A183B"/>
+                </a:solidFill>
+              </a:rPr>
+              <a:t> para </a:t>
+            </a:r>
+            <a:r>
+              <a:rPr lang="en-US" sz="1600" b="1" dirty="0" err="1">
+                <a:solidFill>
+                  <a:srgbClr val="0A183B"/>
+                </a:solidFill>
+              </a:rPr>
+              <a:t>Docentes</a:t>
+            </a:r>
+            <a:r>
+              <a:rPr lang="en-US" sz="1600" b="1" dirty="0">
+                <a:solidFill>
+                  <a:srgbClr val="0A183B"/>
+                </a:solidFill>
+              </a:rPr>
+              <a:t> (Python + </a:t>
+            </a:r>
+            <a:r>
+              <a:rPr lang="en-US" sz="1600" b="1" dirty="0" err="1">
+                <a:solidFill>
+                  <a:srgbClr val="0A183B"/>
+                </a:solidFill>
+              </a:rPr>
+              <a:t>Jupyter</a:t>
+            </a:r>
+            <a:r>
+              <a:rPr lang="en-US" sz="1600" b="1" dirty="0">
+                <a:solidFill>
+                  <a:srgbClr val="0A183B"/>
+                </a:solidFill>
+              </a:rPr>
+              <a:t>)</a:t>
+            </a:r>
+          </a:p>
+          <a:p>
+            <a:r>
+              <a:rPr lang="en-US" sz="1600" dirty="0">
+                <a:solidFill>
+                  <a:srgbClr val="4496CF"/>
+                </a:solidFill>
+              </a:rPr>
+              <a:t>Sofía Martin, Ariel Ramos, Liliana Hurtado, Sebastián Flores</a:t>
+            </a:r>
+          </a:p>
+          <a:p>
+            <a:r>
+              <a:rPr lang="en-US" sz="1600" dirty="0" err="1">
+                <a:solidFill>
+                  <a:srgbClr val="4496CF"/>
+                </a:solidFill>
+              </a:rPr>
+              <a:t>PyCon</a:t>
+            </a:r>
+            <a:r>
+              <a:rPr lang="en-US" sz="1600" dirty="0">
+                <a:solidFill>
+                  <a:srgbClr val="4496CF"/>
+                </a:solidFill>
+              </a:rPr>
+              <a:t> Argentina, 29 </a:t>
+            </a:r>
+            <a:r>
+              <a:rPr lang="en-US" sz="1600" dirty="0" err="1">
+                <a:solidFill>
+                  <a:srgbClr val="4496CF"/>
+                </a:solidFill>
+              </a:rPr>
+              <a:t>Noviembre</a:t>
+            </a:r>
+            <a:r>
+              <a:rPr lang="en-US" sz="1600" dirty="0">
+                <a:solidFill>
+                  <a:srgbClr val="4496CF"/>
+                </a:solidFill>
+              </a:rPr>
+              <a:t> 2021</a:t>
+            </a:r>
+          </a:p>
+        </p:txBody>
+      </p:sp>
+      <p:pic>
+        <p:nvPicPr>
+          <p:cNvPr id="4" name="Imagen 3"/>
+          <p:cNvPicPr>
+            <a:picLocks noChangeAspect="1"/>
+          </p:cNvPicPr>
+          <p:nvPr/>
+        </p:nvPicPr>
+        <p:blipFill>
+          <a:blip r:embed="rId4">
+            <a:extLst>
+              <a:ext uri="{28A0092B-C50C-407E-A947-70E740481C1C}">
+                <a14:useLocalDpi xmlns:a14="http://schemas.microsoft.com/office/drawing/2010/main" val="0"/>
+              </a:ext>
+            </a:extLst>
+          </a:blip>
+          <a:stretch>
+            <a:fillRect/>
+          </a:stretch>
+        </p:blipFill>
+        <p:spPr>
+          <a:xfrm>
+            <a:off x="3206356" y="1804843"/>
+            <a:ext cx="8311866" cy="4671775"/>
+          </a:xfrm>
+          <a:prstGeom prst="rect">
+            <a:avLst/>
+          </a:prstGeom>
+        </p:spPr>
+      </p:pic>
+    </p:spTree>
+    <p:extLst>
+      <p:ext uri="{BB962C8B-B14F-4D97-AF65-F5344CB8AC3E}">
+        <p14:creationId xmlns:p14="http://schemas.microsoft.com/office/powerpoint/2010/main" val="234857024"/>
+      </p:ext>
+    </p:extLst>
+  </p:cSld>
+  <p:clrMapOvr>
+    <a:masterClrMapping/>
+  </p:clrMapOvr>
+</p:sld>
+</file>
+
+<file path=ppt/slides/slide9.xml><?xml version="1.0" encoding="utf-8"?>
+<p:sld xmlns:a="http://schemas.openxmlformats.org/drawingml/2006/main" xmlns:r="http://schemas.openxmlformats.org/officeDocument/2006/relationships" xmlns:p="http://schemas.openxmlformats.org/presentationml/2006/main">
+  <p:cSld>
+    <p:spTree>
+      <p:nvGrpSpPr>
+        <p:cNvPr id="1" name=""/>
+        <p:cNvGrpSpPr/>
+        <p:nvPr/>
+      </p:nvGrpSpPr>
+      <p:grpSpPr>
+        <a:xfrm>
+          <a:off x="0" y="0"/>
+          <a:ext cx="0" cy="0"/>
+          <a:chOff x="0" y="0"/>
+          <a:chExt cx="0" cy="0"/>
+        </a:xfrm>
+      </p:grpSpPr>
+      <p:pic>
+        <p:nvPicPr>
+          <p:cNvPr id="5" name="Picture 4">
+            <a:extLst>
+              <a:ext uri="{FF2B5EF4-FFF2-40B4-BE49-F238E27FC236}">
+                <a16:creationId xmlns:a16="http://schemas.microsoft.com/office/drawing/2014/main" xmlns="" id="{E3163627-6D5A-554C-A441-6156CE28B68A}"/>
+              </a:ext>
+            </a:extLst>
+          </p:cNvPr>
+          <p:cNvPicPr>
+            <a:picLocks noChangeAspect="1"/>
+          </p:cNvPicPr>
+          <p:nvPr/>
+        </p:nvPicPr>
+        <p:blipFill rotWithShape="1">
+          <a:blip r:embed="rId2"/>
+          <a:srcRect l="956" t="1059" r="1448" b="1328"/>
+          <a:stretch/>
+        </p:blipFill>
+        <p:spPr>
+          <a:xfrm>
+            <a:off x="32554" y="62144"/>
+            <a:ext cx="2394767" cy="1535837"/>
+          </a:xfrm>
+          <a:prstGeom prst="rect">
+            <a:avLst/>
+          </a:prstGeom>
+        </p:spPr>
+      </p:pic>
+      <p:pic>
+        <p:nvPicPr>
+          <p:cNvPr id="7" name="Picture 6">
+            <a:extLst>
+              <a:ext uri="{FF2B5EF4-FFF2-40B4-BE49-F238E27FC236}">
+                <a16:creationId xmlns:a16="http://schemas.microsoft.com/office/drawing/2014/main" xmlns="" id="{7E0D9E8F-A890-6643-9613-BB7283B924ED}"/>
+              </a:ext>
+            </a:extLst>
+          </p:cNvPr>
+          <p:cNvPicPr>
+            <a:picLocks noChangeAspect="1"/>
+          </p:cNvPicPr>
+          <p:nvPr/>
+        </p:nvPicPr>
+        <p:blipFill rotWithShape="1">
+          <a:blip r:embed="rId3"/>
+          <a:srcRect t="21248" b="19538"/>
+          <a:stretch/>
+        </p:blipFill>
+        <p:spPr>
+          <a:xfrm>
+            <a:off x="9111448" y="0"/>
+            <a:ext cx="3047998" cy="1804844"/>
+          </a:xfrm>
+          <a:prstGeom prst="rect">
+            <a:avLst/>
+          </a:prstGeom>
+        </p:spPr>
+      </p:pic>
+      <p:sp>
+        <p:nvSpPr>
+          <p:cNvPr id="2" name="TextBox 1">
+            <a:extLst>
+              <a:ext uri="{FF2B5EF4-FFF2-40B4-BE49-F238E27FC236}">
+                <a16:creationId xmlns:a16="http://schemas.microsoft.com/office/drawing/2014/main" xmlns="" id="{0145ED7C-6101-834A-91B4-462ACD98029A}"/>
+              </a:ext>
+            </a:extLst>
+          </p:cNvPr>
+          <p:cNvSpPr txBox="1"/>
+          <p:nvPr/>
+        </p:nvSpPr>
+        <p:spPr>
+          <a:xfrm>
+            <a:off x="2427321" y="229897"/>
+            <a:ext cx="6074676" cy="1077218"/>
+          </a:xfrm>
+          <a:prstGeom prst="rect">
+            <a:avLst/>
+          </a:prstGeom>
+          <a:noFill/>
+        </p:spPr>
+        <p:txBody>
+          <a:bodyPr wrap="none" rtlCol="0">
+            <a:spAutoFit/>
+          </a:bodyPr>
+          <a:lstStyle/>
+          <a:p>
+            <a:r>
+              <a:rPr lang="en-US" sz="1600" dirty="0">
+                <a:solidFill>
+                  <a:srgbClr val="4496CF"/>
+                </a:solidFill>
+              </a:rPr>
+              <a:t>Taller: </a:t>
+            </a:r>
+          </a:p>
+          <a:p>
+            <a:r>
+              <a:rPr lang="en-US" sz="1600" b="1" dirty="0" err="1">
+                <a:solidFill>
+                  <a:srgbClr val="0A183B"/>
+                </a:solidFill>
+              </a:rPr>
+              <a:t>Programar</a:t>
+            </a:r>
+            <a:r>
+              <a:rPr lang="en-US" sz="1600" b="1" dirty="0">
+                <a:solidFill>
+                  <a:srgbClr val="0A183B"/>
+                </a:solidFill>
+              </a:rPr>
+              <a:t> y </a:t>
+            </a:r>
+            <a:r>
+              <a:rPr lang="en-US" sz="1600" b="1" dirty="0" err="1">
+                <a:solidFill>
+                  <a:srgbClr val="0A183B"/>
+                </a:solidFill>
+              </a:rPr>
+              <a:t>Reprogramar</a:t>
+            </a:r>
+            <a:r>
+              <a:rPr lang="en-US" sz="1600" b="1" dirty="0">
+                <a:solidFill>
+                  <a:srgbClr val="0A183B"/>
+                </a:solidFill>
+              </a:rPr>
+              <a:t> </a:t>
+            </a:r>
+            <a:r>
+              <a:rPr lang="en-US" sz="1600" b="1" dirty="0" err="1">
+                <a:solidFill>
+                  <a:srgbClr val="0A183B"/>
+                </a:solidFill>
+              </a:rPr>
+              <a:t>Recursos</a:t>
+            </a:r>
+            <a:r>
+              <a:rPr lang="en-US" sz="1600" b="1" dirty="0">
+                <a:solidFill>
+                  <a:srgbClr val="0A183B"/>
+                </a:solidFill>
+              </a:rPr>
+              <a:t> para </a:t>
+            </a:r>
+            <a:r>
+              <a:rPr lang="en-US" sz="1600" b="1" dirty="0" err="1">
+                <a:solidFill>
+                  <a:srgbClr val="0A183B"/>
+                </a:solidFill>
+              </a:rPr>
+              <a:t>Docentes</a:t>
+            </a:r>
+            <a:r>
+              <a:rPr lang="en-US" sz="1600" b="1" dirty="0">
+                <a:solidFill>
+                  <a:srgbClr val="0A183B"/>
+                </a:solidFill>
+              </a:rPr>
+              <a:t> (Python + </a:t>
+            </a:r>
+            <a:r>
+              <a:rPr lang="en-US" sz="1600" b="1" dirty="0" err="1">
+                <a:solidFill>
+                  <a:srgbClr val="0A183B"/>
+                </a:solidFill>
+              </a:rPr>
+              <a:t>Jupyter</a:t>
+            </a:r>
+            <a:r>
+              <a:rPr lang="en-US" sz="1600" b="1" dirty="0">
+                <a:solidFill>
+                  <a:srgbClr val="0A183B"/>
+                </a:solidFill>
+              </a:rPr>
+              <a:t>)</a:t>
+            </a:r>
+          </a:p>
+          <a:p>
+            <a:r>
+              <a:rPr lang="en-US" sz="1600" dirty="0">
+                <a:solidFill>
+                  <a:srgbClr val="4496CF"/>
+                </a:solidFill>
+              </a:rPr>
+              <a:t>Sofía Martin, Ariel Ramos, Liliana Hurtado, Sebastián Flores</a:t>
+            </a:r>
+          </a:p>
+          <a:p>
+            <a:r>
+              <a:rPr lang="en-US" sz="1600" dirty="0" err="1">
+                <a:solidFill>
+                  <a:srgbClr val="4496CF"/>
+                </a:solidFill>
+              </a:rPr>
+              <a:t>PyCon</a:t>
+            </a:r>
+            <a:r>
+              <a:rPr lang="en-US" sz="1600" dirty="0">
+                <a:solidFill>
+                  <a:srgbClr val="4496CF"/>
+                </a:solidFill>
+              </a:rPr>
+              <a:t> Argentina, 29 </a:t>
+            </a:r>
+            <a:r>
+              <a:rPr lang="en-US" sz="1600" dirty="0" err="1">
+                <a:solidFill>
+                  <a:srgbClr val="4496CF"/>
+                </a:solidFill>
+              </a:rPr>
+              <a:t>Noviembre</a:t>
+            </a:r>
+            <a:r>
+              <a:rPr lang="en-US" sz="1600" dirty="0">
+                <a:solidFill>
+                  <a:srgbClr val="4496CF"/>
+                </a:solidFill>
+              </a:rPr>
+              <a:t> 2021</a:t>
+            </a:r>
+          </a:p>
+        </p:txBody>
+      </p:sp>
+      <p:pic>
+        <p:nvPicPr>
+          <p:cNvPr id="3" name="Imagen 2"/>
+          <p:cNvPicPr>
+            <a:picLocks noChangeAspect="1"/>
+          </p:cNvPicPr>
+          <p:nvPr/>
+        </p:nvPicPr>
+        <p:blipFill>
+          <a:blip r:embed="rId4">
+            <a:extLst>
+              <a:ext uri="{28A0092B-C50C-407E-A947-70E740481C1C}">
+                <a14:useLocalDpi xmlns:a14="http://schemas.microsoft.com/office/drawing/2010/main" val="0"/>
+              </a:ext>
+            </a:extLst>
+          </a:blip>
+          <a:stretch>
+            <a:fillRect/>
+          </a:stretch>
+        </p:blipFill>
+        <p:spPr>
+          <a:xfrm>
+            <a:off x="3206356" y="1804843"/>
+            <a:ext cx="8311866" cy="4671775"/>
+          </a:xfrm>
+          <a:prstGeom prst="rect">
+            <a:avLst/>
+          </a:prstGeom>
+        </p:spPr>
+      </p:pic>
+    </p:spTree>
+    <p:extLst>
+      <p:ext uri="{BB962C8B-B14F-4D97-AF65-F5344CB8AC3E}">
+        <p14:creationId xmlns:p14="http://schemas.microsoft.com/office/powerpoint/2010/main" val="559821463"/>
       </p:ext>
     </p:extLst>
   </p:cSld>

</xml_diff>